<commit_message>
updated scope; finished pointers
</commit_message>
<xml_diff>
--- a/C-Course/Slides/Section10-Pointers.pptx
+++ b/C-Course/Slides/Section10-Pointers.pptx
@@ -5,11 +5,11 @@
     <p:sldMasterId id="2147483648" r:id="rId1"/>
   </p:sldMasterIdLst>
   <p:notesMasterIdLst>
-    <p:notesMasterId r:id="rId18"/>
+    <p:notesMasterId r:id="rId29"/>
   </p:notesMasterIdLst>
   <p:sldIdLst>
     <p:sldId id="256" r:id="rId2"/>
-    <p:sldId id="268" r:id="rId3"/>
+    <p:sldId id="291" r:id="rId3"/>
     <p:sldId id="270" r:id="rId4"/>
     <p:sldId id="273" r:id="rId5"/>
     <p:sldId id="274" r:id="rId6"/>
@@ -22,8 +22,19 @@
     <p:sldId id="282" r:id="rId13"/>
     <p:sldId id="283" r:id="rId14"/>
     <p:sldId id="280" r:id="rId15"/>
-    <p:sldId id="279" r:id="rId16"/>
-    <p:sldId id="266" r:id="rId17"/>
+    <p:sldId id="284" r:id="rId16"/>
+    <p:sldId id="285" r:id="rId17"/>
+    <p:sldId id="286" r:id="rId18"/>
+    <p:sldId id="287" r:id="rId19"/>
+    <p:sldId id="288" r:id="rId20"/>
+    <p:sldId id="289" r:id="rId21"/>
+    <p:sldId id="292" r:id="rId22"/>
+    <p:sldId id="293" r:id="rId23"/>
+    <p:sldId id="294" r:id="rId24"/>
+    <p:sldId id="295" r:id="rId25"/>
+    <p:sldId id="296" r:id="rId26"/>
+    <p:sldId id="290" r:id="rId27"/>
+    <p:sldId id="266" r:id="rId28"/>
   </p:sldIdLst>
   <p:sldSz cx="12192000" cy="6858000"/>
   <p:notesSz cx="6858000" cy="9144000"/>
@@ -212,7 +223,7 @@
           <a:p>
             <a:fld id="{CF228947-4375-1244-9960-5B734462073D}" type="datetimeFigureOut">
               <a:rPr lang="en-US" smtClean="0"/>
-              <a:t>4/27/21</a:t>
+              <a:t>5/31/21</a:t>
             </a:fld>
             <a:endParaRPr lang="en-US"/>
           </a:p>
@@ -862,6 +873,20 @@
           <a:bodyPr/>
           <a:lstStyle/>
           <a:p>
+            <a:r>
+              <a:rPr lang="en-US" dirty="0"/>
+              <a:t>https://</a:t>
+            </a:r>
+            <a:r>
+              <a:rPr lang="en-US" dirty="0" err="1"/>
+              <a:t>www.programiz.com</a:t>
+            </a:r>
+            <a:r>
+              <a:rPr lang="en-US" dirty="0"/>
+              <a:t>/c-programming/c-pointers-arrays</a:t>
+            </a:r>
+          </a:p>
+          <a:p>
             <a:endParaRPr lang="en-US" dirty="0"/>
           </a:p>
         </p:txBody>
@@ -883,7 +908,200 @@
           <a:p>
             <a:fld id="{4A561311-75B6-5448-8072-CF99FAEFE802}" type="slidenum">
               <a:rPr lang="en-US" smtClean="0"/>
-              <a:t>16</a:t>
+              <a:t>15</a:t>
+            </a:fld>
+            <a:endParaRPr lang="en-US"/>
+          </a:p>
+        </p:txBody>
+      </p:sp>
+    </p:spTree>
+    <p:extLst>
+      <p:ext uri="{BB962C8B-B14F-4D97-AF65-F5344CB8AC3E}">
+        <p14:creationId xmlns:p14="http://schemas.microsoft.com/office/powerpoint/2010/main" val="1497753939"/>
+      </p:ext>
+    </p:extLst>
+  </p:cSld>
+  <p:clrMapOvr>
+    <a:masterClrMapping/>
+  </p:clrMapOvr>
+</p:notes>
+</file>
+
+<file path=ppt/notesSlides/notesSlide5.xml><?xml version="1.0" encoding="utf-8"?>
+<p:notes xmlns:a="http://schemas.openxmlformats.org/drawingml/2006/main" xmlns:r="http://schemas.openxmlformats.org/officeDocument/2006/relationships" xmlns:p="http://schemas.openxmlformats.org/presentationml/2006/main">
+  <p:cSld>
+    <p:spTree>
+      <p:nvGrpSpPr>
+        <p:cNvPr id="1" name=""/>
+        <p:cNvGrpSpPr/>
+        <p:nvPr/>
+      </p:nvGrpSpPr>
+      <p:grpSpPr>
+        <a:xfrm>
+          <a:off x="0" y="0"/>
+          <a:ext cx="0" cy="0"/>
+          <a:chOff x="0" y="0"/>
+          <a:chExt cx="0" cy="0"/>
+        </a:xfrm>
+      </p:grpSpPr>
+      <p:sp>
+        <p:nvSpPr>
+          <p:cNvPr id="2" name="Slide Image Placeholder 1"/>
+          <p:cNvSpPr>
+            <a:spLocks noGrp="1" noRot="1" noChangeAspect="1"/>
+          </p:cNvSpPr>
+          <p:nvPr>
+            <p:ph type="sldImg"/>
+          </p:nvPr>
+        </p:nvSpPr>
+        <p:spPr/>
+      </p:sp>
+      <p:sp>
+        <p:nvSpPr>
+          <p:cNvPr id="3" name="Notes Placeholder 2"/>
+          <p:cNvSpPr>
+            <a:spLocks noGrp="1"/>
+          </p:cNvSpPr>
+          <p:nvPr>
+            <p:ph type="body" idx="1"/>
+          </p:nvPr>
+        </p:nvSpPr>
+        <p:spPr/>
+        <p:txBody>
+          <a:bodyPr/>
+          <a:lstStyle/>
+          <a:p>
+            <a:r>
+              <a:rPr lang="en-US" dirty="0"/>
+              <a:t>https://</a:t>
+            </a:r>
+            <a:r>
+              <a:rPr lang="en-US" dirty="0" err="1"/>
+              <a:t>www.programiz.com</a:t>
+            </a:r>
+            <a:r>
+              <a:rPr lang="en-US" dirty="0"/>
+              <a:t>/c-programming/c-pointer-functions</a:t>
+            </a:r>
+          </a:p>
+        </p:txBody>
+      </p:sp>
+      <p:sp>
+        <p:nvSpPr>
+          <p:cNvPr id="4" name="Slide Number Placeholder 3"/>
+          <p:cNvSpPr>
+            <a:spLocks noGrp="1"/>
+          </p:cNvSpPr>
+          <p:nvPr>
+            <p:ph type="sldNum" sz="quarter" idx="5"/>
+          </p:nvPr>
+        </p:nvSpPr>
+        <p:spPr/>
+        <p:txBody>
+          <a:bodyPr/>
+          <a:lstStyle/>
+          <a:p>
+            <a:fld id="{4A561311-75B6-5448-8072-CF99FAEFE802}" type="slidenum">
+              <a:rPr lang="en-US" smtClean="0"/>
+              <a:t>19</a:t>
+            </a:fld>
+            <a:endParaRPr lang="en-US"/>
+          </a:p>
+        </p:txBody>
+      </p:sp>
+    </p:spTree>
+    <p:extLst>
+      <p:ext uri="{BB962C8B-B14F-4D97-AF65-F5344CB8AC3E}">
+        <p14:creationId xmlns:p14="http://schemas.microsoft.com/office/powerpoint/2010/main" val="3084550424"/>
+      </p:ext>
+    </p:extLst>
+  </p:cSld>
+  <p:clrMapOvr>
+    <a:masterClrMapping/>
+  </p:clrMapOvr>
+</p:notes>
+</file>
+
+<file path=ppt/notesSlides/notesSlide6.xml><?xml version="1.0" encoding="utf-8"?>
+<p:notes xmlns:a="http://schemas.openxmlformats.org/drawingml/2006/main" xmlns:r="http://schemas.openxmlformats.org/officeDocument/2006/relationships" xmlns:p="http://schemas.openxmlformats.org/presentationml/2006/main">
+  <p:cSld>
+    <p:spTree>
+      <p:nvGrpSpPr>
+        <p:cNvPr id="1" name=""/>
+        <p:cNvGrpSpPr/>
+        <p:nvPr/>
+      </p:nvGrpSpPr>
+      <p:grpSpPr>
+        <a:xfrm>
+          <a:off x="0" y="0"/>
+          <a:ext cx="0" cy="0"/>
+          <a:chOff x="0" y="0"/>
+          <a:chExt cx="0" cy="0"/>
+        </a:xfrm>
+      </p:grpSpPr>
+      <p:sp>
+        <p:nvSpPr>
+          <p:cNvPr id="2" name="Slide Image Placeholder 1"/>
+          <p:cNvSpPr>
+            <a:spLocks noGrp="1" noRot="1" noChangeAspect="1"/>
+          </p:cNvSpPr>
+          <p:nvPr>
+            <p:ph type="sldImg"/>
+          </p:nvPr>
+        </p:nvSpPr>
+        <p:spPr/>
+      </p:sp>
+      <p:sp>
+        <p:nvSpPr>
+          <p:cNvPr id="3" name="Notes Placeholder 2"/>
+          <p:cNvSpPr>
+            <a:spLocks noGrp="1"/>
+          </p:cNvSpPr>
+          <p:nvPr>
+            <p:ph type="body" idx="1"/>
+          </p:nvPr>
+        </p:nvSpPr>
+        <p:spPr/>
+        <p:txBody>
+          <a:bodyPr/>
+          <a:lstStyle/>
+          <a:p>
+            <a:r>
+              <a:rPr lang="en-US" dirty="0"/>
+              <a:t>https://</a:t>
+            </a:r>
+            <a:r>
+              <a:rPr lang="en-US" dirty="0" err="1"/>
+              <a:t>www.programiz.com</a:t>
+            </a:r>
+            <a:r>
+              <a:rPr lang="en-US" dirty="0"/>
+              <a:t>/c-programming/c-pointer-functions</a:t>
+            </a:r>
+          </a:p>
+          <a:p>
+            <a:endParaRPr lang="en-US" dirty="0"/>
+          </a:p>
+        </p:txBody>
+      </p:sp>
+      <p:sp>
+        <p:nvSpPr>
+          <p:cNvPr id="4" name="Slide Number Placeholder 3"/>
+          <p:cNvSpPr>
+            <a:spLocks noGrp="1"/>
+          </p:cNvSpPr>
+          <p:nvPr>
+            <p:ph type="sldNum" sz="quarter" idx="5"/>
+          </p:nvPr>
+        </p:nvSpPr>
+        <p:spPr/>
+        <p:txBody>
+          <a:bodyPr/>
+          <a:lstStyle/>
+          <a:p>
+            <a:fld id="{4A561311-75B6-5448-8072-CF99FAEFE802}" type="slidenum">
+              <a:rPr lang="en-US" smtClean="0"/>
+              <a:t>27</a:t>
             </a:fld>
             <a:endParaRPr lang="en-US"/>
           </a:p>
@@ -1132,7 +1350,7 @@
             <a:fld id="{B61BEF0D-F0BB-DE4B-95CE-6DB70DBA9567}" type="datetimeFigureOut">
               <a:rPr lang="en-US" dirty="0"/>
               <a:pPr/>
-              <a:t>4/27/21</a:t>
+              <a:t>5/31/21</a:t>
             </a:fld>
             <a:endParaRPr lang="en-US" dirty="0"/>
           </a:p>
@@ -1463,7 +1681,7 @@
             <a:fld id="{B61BEF0D-F0BB-DE4B-95CE-6DB70DBA9567}" type="datetimeFigureOut">
               <a:rPr lang="en-US" dirty="0"/>
               <a:pPr/>
-              <a:t>4/27/21</a:t>
+              <a:t>5/31/21</a:t>
             </a:fld>
             <a:endParaRPr lang="en-US" dirty="0"/>
           </a:p>
@@ -1738,7 +1956,7 @@
             <a:fld id="{B61BEF0D-F0BB-DE4B-95CE-6DB70DBA9567}" type="datetimeFigureOut">
               <a:rPr lang="en-US" dirty="0"/>
               <a:pPr/>
-              <a:t>4/27/21</a:t>
+              <a:t>5/31/21</a:t>
             </a:fld>
             <a:endParaRPr lang="en-US" dirty="0"/>
           </a:p>
@@ -2303,7 +2521,7 @@
             <a:fld id="{B61BEF0D-F0BB-DE4B-95CE-6DB70DBA9567}" type="datetimeFigureOut">
               <a:rPr lang="en-US" dirty="0"/>
               <a:pPr/>
-              <a:t>4/27/21</a:t>
+              <a:t>5/31/21</a:t>
             </a:fld>
             <a:endParaRPr lang="en-US" dirty="0"/>
           </a:p>
@@ -2578,7 +2796,7 @@
             <a:fld id="{B61BEF0D-F0BB-DE4B-95CE-6DB70DBA9567}" type="datetimeFigureOut">
               <a:rPr lang="en-US" dirty="0"/>
               <a:pPr/>
-              <a:t>4/27/21</a:t>
+              <a:t>5/31/21</a:t>
             </a:fld>
             <a:endParaRPr lang="en-US" dirty="0"/>
           </a:p>
@@ -3137,7 +3355,7 @@
             <a:fld id="{B61BEF0D-F0BB-DE4B-95CE-6DB70DBA9567}" type="datetimeFigureOut">
               <a:rPr lang="en-US" dirty="0"/>
               <a:pPr/>
-              <a:t>4/27/21</a:t>
+              <a:t>5/31/21</a:t>
             </a:fld>
             <a:endParaRPr lang="en-US" dirty="0"/>
           </a:p>
@@ -3461,7 +3679,7 @@
             <a:fld id="{B61BEF0D-F0BB-DE4B-95CE-6DB70DBA9567}" type="datetimeFigureOut">
               <a:rPr lang="en-US" dirty="0"/>
               <a:pPr/>
-              <a:t>4/27/21</a:t>
+              <a:t>5/31/21</a:t>
             </a:fld>
             <a:endParaRPr lang="en-US" dirty="0"/>
           </a:p>
@@ -3635,7 +3853,7 @@
             <a:fld id="{B61BEF0D-F0BB-DE4B-95CE-6DB70DBA9567}" type="datetimeFigureOut">
               <a:rPr lang="en-US" dirty="0"/>
               <a:pPr/>
-              <a:t>4/27/21</a:t>
+              <a:t>5/31/21</a:t>
             </a:fld>
             <a:endParaRPr lang="en-US" dirty="0"/>
           </a:p>
@@ -3870,7 +4088,7 @@
             <a:fld id="{B61BEF0D-F0BB-DE4B-95CE-6DB70DBA9567}" type="datetimeFigureOut">
               <a:rPr lang="en-US" dirty="0"/>
               <a:pPr/>
-              <a:t>4/27/21</a:t>
+              <a:t>5/31/21</a:t>
             </a:fld>
             <a:endParaRPr lang="en-US" dirty="0"/>
           </a:p>
@@ -4067,7 +4285,7 @@
             <a:fld id="{B61BEF0D-F0BB-DE4B-95CE-6DB70DBA9567}" type="datetimeFigureOut">
               <a:rPr lang="en-US" dirty="0"/>
               <a:pPr/>
-              <a:t>4/27/21</a:t>
+              <a:t>5/31/21</a:t>
             </a:fld>
             <a:endParaRPr lang="en-US" dirty="0"/>
           </a:p>
@@ -4340,7 +4558,7 @@
             <a:fld id="{B61BEF0D-F0BB-DE4B-95CE-6DB70DBA9567}" type="datetimeFigureOut">
               <a:rPr lang="en-US" dirty="0"/>
               <a:pPr/>
-              <a:t>4/27/21</a:t>
+              <a:t>5/31/21</a:t>
             </a:fld>
             <a:endParaRPr lang="en-US" dirty="0"/>
           </a:p>
@@ -4603,7 +4821,7 @@
             <a:fld id="{B61BEF0D-F0BB-DE4B-95CE-6DB70DBA9567}" type="datetimeFigureOut">
               <a:rPr lang="en-US" dirty="0"/>
               <a:pPr/>
-              <a:t>4/27/21</a:t>
+              <a:t>5/31/21</a:t>
             </a:fld>
             <a:endParaRPr lang="en-US" dirty="0"/>
           </a:p>
@@ -4974,7 +5192,7 @@
             <a:fld id="{B61BEF0D-F0BB-DE4B-95CE-6DB70DBA9567}" type="datetimeFigureOut">
               <a:rPr lang="en-US" dirty="0"/>
               <a:pPr/>
-              <a:t>4/27/21</a:t>
+              <a:t>5/31/21</a:t>
             </a:fld>
             <a:endParaRPr lang="en-US" dirty="0"/>
           </a:p>
@@ -5119,7 +5337,7 @@
             <a:fld id="{B61BEF0D-F0BB-DE4B-95CE-6DB70DBA9567}" type="datetimeFigureOut">
               <a:rPr lang="en-US" dirty="0"/>
               <a:pPr/>
-              <a:t>4/27/21</a:t>
+              <a:t>5/31/21</a:t>
             </a:fld>
             <a:endParaRPr lang="en-US" dirty="0"/>
           </a:p>
@@ -5241,7 +5459,7 @@
             <a:fld id="{B61BEF0D-F0BB-DE4B-95CE-6DB70DBA9567}" type="datetimeFigureOut">
               <a:rPr lang="en-US" dirty="0"/>
               <a:pPr/>
-              <a:t>4/27/21</a:t>
+              <a:t>5/31/21</a:t>
             </a:fld>
             <a:endParaRPr lang="en-US" dirty="0"/>
           </a:p>
@@ -5523,7 +5741,7 @@
             <a:fld id="{B61BEF0D-F0BB-DE4B-95CE-6DB70DBA9567}" type="datetimeFigureOut">
               <a:rPr lang="en-US" dirty="0"/>
               <a:pPr/>
-              <a:t>4/27/21</a:t>
+              <a:t>5/31/21</a:t>
             </a:fld>
             <a:endParaRPr lang="en-US" dirty="0"/>
           </a:p>
@@ -5844,7 +6062,7 @@
             <a:fld id="{B61BEF0D-F0BB-DE4B-95CE-6DB70DBA9567}" type="datetimeFigureOut">
               <a:rPr lang="en-US" dirty="0"/>
               <a:pPr/>
-              <a:t>4/27/21</a:t>
+              <a:t>5/31/21</a:t>
             </a:fld>
             <a:endParaRPr lang="en-US" dirty="0"/>
           </a:p>
@@ -6055,7 +6273,7 @@
             <a:fld id="{B61BEF0D-F0BB-DE4B-95CE-6DB70DBA9567}" type="datetimeFigureOut">
               <a:rPr lang="en-US" dirty="0"/>
               <a:pPr/>
-              <a:t>4/27/21</a:t>
+              <a:t>5/31/21</a:t>
             </a:fld>
             <a:endParaRPr lang="en-US" dirty="0"/>
           </a:p>
@@ -8435,34 +8653,6 @@
       </p:grpSpPr>
       <p:sp>
         <p:nvSpPr>
-          <p:cNvPr id="2" name="Title 1">
-            <a:extLst>
-              <a:ext uri="{FF2B5EF4-FFF2-40B4-BE49-F238E27FC236}">
-                <a16:creationId xmlns:a16="http://schemas.microsoft.com/office/drawing/2014/main" id="{99DDAA86-5644-5C4B-A745-CDAD3DA8AC1A}"/>
-              </a:ext>
-            </a:extLst>
-          </p:cNvPr>
-          <p:cNvSpPr>
-            <a:spLocks noGrp="1"/>
-          </p:cNvSpPr>
-          <p:nvPr>
-            <p:ph type="title"/>
-          </p:nvPr>
-        </p:nvSpPr>
-        <p:spPr/>
-        <p:txBody>
-          <a:bodyPr/>
-          <a:lstStyle/>
-          <a:p>
-            <a:r>
-              <a:rPr lang="en-US" dirty="0"/>
-              <a:t>Using (basic) pointer??</a:t>
-            </a:r>
-          </a:p>
-        </p:txBody>
-      </p:sp>
-      <p:sp>
-        <p:nvSpPr>
           <p:cNvPr id="3" name="Content Placeholder 2">
             <a:extLst>
               <a:ext uri="{FF2B5EF4-FFF2-40B4-BE49-F238E27FC236}">
@@ -8479,10 +8669,18 @@
         </p:nvSpPr>
         <p:spPr/>
         <p:txBody>
-          <a:bodyPr/>
-          <a:lstStyle/>
-          <a:p>
-            <a:endParaRPr lang="en-US"/>
+          <a:bodyPr>
+            <a:normAutofit/>
+          </a:bodyPr>
+          <a:lstStyle/>
+          <a:p>
+            <a:pPr marL="0" indent="0" algn="ctr">
+              <a:buNone/>
+            </a:pPr>
+            <a:r>
+              <a:rPr lang="en-US" sz="9600" dirty="0"/>
+              <a:t>DEMO</a:t>
+            </a:r>
           </a:p>
         </p:txBody>
       </p:sp>
@@ -8502,6 +8700,15 @@
 <file path=ppt/slides/slide15.xml><?xml version="1.0" encoding="utf-8"?>
 <p:sld xmlns:a="http://schemas.openxmlformats.org/drawingml/2006/main" xmlns:r="http://schemas.openxmlformats.org/officeDocument/2006/relationships" xmlns:p="http://schemas.openxmlformats.org/presentationml/2006/main">
   <p:cSld>
+    <p:bg>
+      <p:bgPr>
+        <a:blipFill>
+          <a:blip r:embed="rId3"/>
+          <a:stretch/>
+        </a:blipFill>
+        <a:effectLst/>
+      </p:bgPr>
+    </p:bg>
     <p:spTree>
       <p:nvGrpSpPr>
         <p:cNvPr id="1" name=""/>
@@ -8521,7 +8728,7 @@
           <p:cNvPr id="2" name="Title 1">
             <a:extLst>
               <a:ext uri="{FF2B5EF4-FFF2-40B4-BE49-F238E27FC236}">
-                <a16:creationId xmlns:a16="http://schemas.microsoft.com/office/drawing/2014/main" id="{E1014745-57DA-B14D-AC88-6005BD775546}"/>
+                <a16:creationId xmlns:a16="http://schemas.microsoft.com/office/drawing/2014/main" id="{8EA3453A-836C-C24E-9A58-64DE83D2D82E}"/>
               </a:ext>
             </a:extLst>
           </p:cNvPr>
@@ -8532,24 +8739,166 @@
             <p:ph type="title"/>
           </p:nvPr>
         </p:nvSpPr>
-        <p:spPr/>
-        <p:txBody>
-          <a:bodyPr/>
-          <a:lstStyle/>
-          <a:p>
-            <a:r>
-              <a:rPr lang="en-US" dirty="0"/>
-              <a:t>Exercise?</a:t>
-            </a:r>
-          </a:p>
-        </p:txBody>
-      </p:sp>
+        <p:spPr>
+          <a:xfrm>
+            <a:off x="5266892" y="609600"/>
+            <a:ext cx="5550334" cy="1456267"/>
+          </a:xfrm>
+        </p:spPr>
+        <p:txBody>
+          <a:bodyPr>
+            <a:normAutofit/>
+          </a:bodyPr>
+          <a:lstStyle/>
+          <a:p>
+            <a:r>
+              <a:rPr lang="en-US"/>
+              <a:t>Pointers and arrays</a:t>
+            </a:r>
+            <a:endParaRPr lang="en-US" dirty="0"/>
+          </a:p>
+        </p:txBody>
+      </p:sp>
+      <p:pic>
+        <p:nvPicPr>
+          <p:cNvPr id="9" name="Picture 8" descr="A picture containing text, night sky&#10;&#10;Description automatically generated">
+            <a:extLst>
+              <a:ext uri="{FF2B5EF4-FFF2-40B4-BE49-F238E27FC236}">
+                <a16:creationId xmlns:a16="http://schemas.microsoft.com/office/drawing/2014/main" id="{F0576BB3-82E3-0B48-BD2B-F759F1C69099}"/>
+              </a:ext>
+            </a:extLst>
+          </p:cNvPr>
+          <p:cNvPicPr>
+            <a:picLocks noChangeAspect="1"/>
+          </p:cNvPicPr>
+          <p:nvPr/>
+        </p:nvPicPr>
+        <p:blipFill rotWithShape="1">
+          <a:blip r:embed="rId4"/>
+          <a:srcRect t="7394" r="2" b="28998"/>
+          <a:stretch/>
+        </p:blipFill>
+        <p:spPr>
+          <a:xfrm>
+            <a:off x="20" y="1"/>
+            <a:ext cx="4635988" cy="3429000"/>
+          </a:xfrm>
+          <a:prstGeom prst="rect">
+            <a:avLst/>
+          </a:prstGeom>
+        </p:spPr>
+      </p:pic>
+      <p:pic>
+        <p:nvPicPr>
+          <p:cNvPr id="11" name="Picture 10" descr="Text&#10;&#10;Description automatically generated">
+            <a:extLst>
+              <a:ext uri="{FF2B5EF4-FFF2-40B4-BE49-F238E27FC236}">
+                <a16:creationId xmlns:a16="http://schemas.microsoft.com/office/drawing/2014/main" id="{606FDF14-5ECA-F443-925F-CF152E74B792}"/>
+              </a:ext>
+            </a:extLst>
+          </p:cNvPr>
+          <p:cNvPicPr>
+            <a:picLocks noChangeAspect="1"/>
+          </p:cNvPicPr>
+          <p:nvPr/>
+        </p:nvPicPr>
+        <p:blipFill rotWithShape="1">
+          <a:blip r:embed="rId5"/>
+          <a:srcRect l="4779" r="2300" b="3"/>
+          <a:stretch/>
+        </p:blipFill>
+        <p:spPr>
+          <a:xfrm>
+            <a:off x="20" y="3429001"/>
+            <a:ext cx="4635988" cy="3429974"/>
+          </a:xfrm>
+          <a:prstGeom prst="rect">
+            <a:avLst/>
+          </a:prstGeom>
+        </p:spPr>
+      </p:pic>
+      <p:cxnSp>
+        <p:nvCxnSpPr>
+          <p:cNvPr id="16" name="Straight Connector 15">
+            <a:extLst>
+              <a:ext uri="{FF2B5EF4-FFF2-40B4-BE49-F238E27FC236}">
+                <a16:creationId xmlns:a16="http://schemas.microsoft.com/office/drawing/2014/main" id="{B4E57998-7D20-4BE8-9019-4A4122CE3E2B}"/>
+              </a:ext>
+              <a:ext uri="{C183D7F6-B498-43B3-948B-1728B52AA6E4}">
+                <adec:decorative xmlns:adec="http://schemas.microsoft.com/office/drawing/2017/decorative" val="1"/>
+              </a:ext>
+            </a:extLst>
+          </p:cNvPr>
+          <p:cNvCxnSpPr>
+            <a:cxnSpLocks noGrp="1" noRot="1" noChangeAspect="1" noMove="1" noResize="1" noEditPoints="1" noAdjustHandles="1" noChangeArrowheads="1" noChangeShapeType="1"/>
+          </p:cNvCxnSpPr>
+          <p:nvPr>
+            <p:extLst>
+              <p:ext uri="{386F3935-93C4-4BCD-93E2-E3B085C9AB24}">
+                <p16:designElem xmlns:p16="http://schemas.microsoft.com/office/powerpoint/2015/main" val="1"/>
+              </p:ext>
+            </p:extLst>
+          </p:nvPr>
+        </p:nvCxnSpPr>
+        <p:spPr>
+          <a:xfrm>
+            <a:off x="-1590" y="3429000"/>
+            <a:ext cx="4637598" cy="0"/>
+          </a:xfrm>
+          <a:prstGeom prst="line">
+            <a:avLst/>
+          </a:prstGeom>
+          <a:noFill/>
+          <a:ln w="50800" cap="sq" cmpd="dbl">
+            <a:gradFill flip="none" rotWithShape="1">
+              <a:gsLst>
+                <a:gs pos="0">
+                  <a:srgbClr val="FFFFFF"/>
+                </a:gs>
+                <a:gs pos="100000">
+                  <a:schemeClr val="tx1">
+                    <a:alpha val="0"/>
+                  </a:schemeClr>
+                </a:gs>
+              </a:gsLst>
+              <a:path path="circle">
+                <a:fillToRect l="50000" t="50000" r="50000" b="50000"/>
+              </a:path>
+              <a:tileRect/>
+            </a:gradFill>
+            <a:miter lim="800000"/>
+          </a:ln>
+          <a:effectLst>
+            <a:outerShdw blurRad="254000" algn="tl" rotWithShape="0">
+              <a:srgbClr val="000000">
+                <a:alpha val="43000"/>
+              </a:srgbClr>
+            </a:outerShdw>
+          </a:effectLst>
+        </p:spPr>
+        <p:style>
+          <a:lnRef idx="2">
+            <a:schemeClr val="accent1">
+              <a:shade val="50000"/>
+            </a:schemeClr>
+          </a:lnRef>
+          <a:fillRef idx="1">
+            <a:schemeClr val="accent1"/>
+          </a:fillRef>
+          <a:effectRef idx="0">
+            <a:schemeClr val="accent1"/>
+          </a:effectRef>
+          <a:fontRef idx="minor">
+            <a:schemeClr val="lt1"/>
+          </a:fontRef>
+        </p:style>
+      </p:cxnSp>
       <p:sp>
         <p:nvSpPr>
           <p:cNvPr id="3" name="Content Placeholder 2">
             <a:extLst>
               <a:ext uri="{FF2B5EF4-FFF2-40B4-BE49-F238E27FC236}">
-                <a16:creationId xmlns:a16="http://schemas.microsoft.com/office/drawing/2014/main" id="{E899F359-E126-DF4D-AA8D-C511EC564063}"/>
+                <a16:creationId xmlns:a16="http://schemas.microsoft.com/office/drawing/2014/main" id="{44579E0B-C9D9-A849-82FB-472C1343DA4C}"/>
               </a:ext>
             </a:extLst>
           </p:cNvPr>
@@ -8560,19 +8909,145 @@
             <p:ph idx="1"/>
           </p:nvPr>
         </p:nvSpPr>
-        <p:spPr/>
-        <p:txBody>
-          <a:bodyPr/>
-          <a:lstStyle/>
-          <a:p>
-            <a:endParaRPr lang="en-US"/>
-          </a:p>
-        </p:txBody>
-      </p:sp>
+        <p:spPr>
+          <a:xfrm>
+            <a:off x="5266892" y="2142067"/>
+            <a:ext cx="5550334" cy="3649133"/>
+          </a:xfrm>
+        </p:spPr>
+        <p:txBody>
+          <a:bodyPr>
+            <a:normAutofit/>
+          </a:bodyPr>
+          <a:lstStyle/>
+          <a:p>
+            <a:r>
+              <a:rPr lang="en-US" dirty="0"/>
+              <a:t>If we create an int array of size 5 (0-4) then we can see the memory address output below</a:t>
+            </a:r>
+          </a:p>
+          <a:p>
+            <a:r>
+              <a:rPr lang="en-US" dirty="0"/>
+              <a:t>Of course, the addresses could be different on your machine</a:t>
+            </a:r>
+          </a:p>
+          <a:p>
+            <a:r>
+              <a:rPr lang="en-US" dirty="0"/>
+              <a:t>Things to note</a:t>
+            </a:r>
+          </a:p>
+          <a:p>
+            <a:pPr lvl="1"/>
+            <a:r>
+              <a:rPr lang="en-US" dirty="0"/>
+              <a:t>Addresses are moving up sizes of 4, why is that?</a:t>
+            </a:r>
+          </a:p>
+          <a:p>
+            <a:pPr lvl="2"/>
+            <a:r>
+              <a:rPr lang="en-US" dirty="0"/>
+              <a:t>Int type allocations</a:t>
+            </a:r>
+          </a:p>
+          <a:p>
+            <a:pPr lvl="1"/>
+            <a:r>
+              <a:rPr lang="en-US" dirty="0"/>
+              <a:t>Address of our array is the first address. Why is that?</a:t>
+            </a:r>
+          </a:p>
+          <a:p>
+            <a:pPr lvl="2"/>
+            <a:r>
+              <a:rPr lang="en-US" dirty="0"/>
+              <a:t>As mentioned in the “Memory and memory Addresses” slide, the x variable (array in this case) will point to the very first address</a:t>
+            </a:r>
+          </a:p>
+        </p:txBody>
+      </p:sp>
+      <p:cxnSp>
+        <p:nvCxnSpPr>
+          <p:cNvPr id="18" name="Straight Connector 17">
+            <a:extLst>
+              <a:ext uri="{FF2B5EF4-FFF2-40B4-BE49-F238E27FC236}">
+                <a16:creationId xmlns:a16="http://schemas.microsoft.com/office/drawing/2014/main" id="{1EC01BF1-FEAA-4AF6-96A5-24556C1F6BCD}"/>
+              </a:ext>
+              <a:ext uri="{C183D7F6-B498-43B3-948B-1728B52AA6E4}">
+                <adec:decorative xmlns:adec="http://schemas.microsoft.com/office/drawing/2017/decorative" val="1"/>
+              </a:ext>
+            </a:extLst>
+          </p:cNvPr>
+          <p:cNvCxnSpPr>
+            <a:cxnSpLocks noGrp="1" noRot="1" noChangeAspect="1" noMove="1" noResize="1" noEditPoints="1" noAdjustHandles="1" noChangeArrowheads="1" noChangeShapeType="1"/>
+          </p:cNvCxnSpPr>
+          <p:nvPr>
+            <p:extLst>
+              <p:ext uri="{386F3935-93C4-4BCD-93E2-E3B085C9AB24}">
+                <p16:designElem xmlns:p16="http://schemas.microsoft.com/office/powerpoint/2015/main" val="1"/>
+              </p:ext>
+            </p:extLst>
+          </p:nvPr>
+        </p:nvCxnSpPr>
+        <p:spPr>
+          <a:xfrm>
+            <a:off x="4642096" y="0"/>
+            <a:ext cx="680" cy="6858000"/>
+          </a:xfrm>
+          <a:prstGeom prst="line">
+            <a:avLst/>
+          </a:prstGeom>
+          <a:noFill/>
+          <a:ln w="50800" cap="sq" cmpd="dbl">
+            <a:gradFill flip="none" rotWithShape="1">
+              <a:gsLst>
+                <a:gs pos="0">
+                  <a:srgbClr val="FFFFFF"/>
+                </a:gs>
+                <a:gs pos="100000">
+                  <a:schemeClr val="tx1">
+                    <a:alpha val="0"/>
+                  </a:schemeClr>
+                </a:gs>
+              </a:gsLst>
+              <a:path path="circle">
+                <a:fillToRect l="50000" t="50000" r="50000" b="50000"/>
+              </a:path>
+              <a:tileRect/>
+            </a:gradFill>
+            <a:miter lim="800000"/>
+          </a:ln>
+          <a:effectLst>
+            <a:outerShdw blurRad="254000" algn="tl" rotWithShape="0">
+              <a:srgbClr val="000000">
+                <a:alpha val="43000"/>
+              </a:srgbClr>
+            </a:outerShdw>
+          </a:effectLst>
+        </p:spPr>
+        <p:style>
+          <a:lnRef idx="2">
+            <a:schemeClr val="accent1">
+              <a:shade val="50000"/>
+            </a:schemeClr>
+          </a:lnRef>
+          <a:fillRef idx="1">
+            <a:schemeClr val="accent1"/>
+          </a:fillRef>
+          <a:effectRef idx="0">
+            <a:schemeClr val="accent1"/>
+          </a:effectRef>
+          <a:fontRef idx="minor">
+            <a:schemeClr val="lt1"/>
+          </a:fontRef>
+        </p:style>
+      </p:cxnSp>
     </p:spTree>
     <p:extLst>
       <p:ext uri="{BB962C8B-B14F-4D97-AF65-F5344CB8AC3E}">
-        <p14:creationId xmlns:p14="http://schemas.microsoft.com/office/powerpoint/2010/main" val="850427783"/>
+        <p14:creationId xmlns:p14="http://schemas.microsoft.com/office/powerpoint/2010/main" val="1075753035"/>
       </p:ext>
     </p:extLst>
   </p:cSld>
@@ -8583,6 +9058,575 @@
 </file>
 
 <file path=ppt/slides/slide16.xml><?xml version="1.0" encoding="utf-8"?>
+<p:sld xmlns:a="http://schemas.openxmlformats.org/drawingml/2006/main" xmlns:r="http://schemas.openxmlformats.org/officeDocument/2006/relationships" xmlns:p="http://schemas.openxmlformats.org/presentationml/2006/main">
+  <p:cSld>
+    <p:bg>
+      <p:bgPr>
+        <a:blipFill>
+          <a:blip r:embed="rId2"/>
+          <a:stretch/>
+        </a:blipFill>
+        <a:effectLst/>
+      </p:bgPr>
+    </p:bg>
+    <p:spTree>
+      <p:nvGrpSpPr>
+        <p:cNvPr id="1" name=""/>
+        <p:cNvGrpSpPr/>
+        <p:nvPr/>
+      </p:nvGrpSpPr>
+      <p:grpSpPr>
+        <a:xfrm>
+          <a:off x="0" y="0"/>
+          <a:ext cx="0" cy="0"/>
+          <a:chOff x="0" y="0"/>
+          <a:chExt cx="0" cy="0"/>
+        </a:xfrm>
+      </p:grpSpPr>
+      <p:sp>
+        <p:nvSpPr>
+          <p:cNvPr id="2" name="Title 1">
+            <a:extLst>
+              <a:ext uri="{FF2B5EF4-FFF2-40B4-BE49-F238E27FC236}">
+                <a16:creationId xmlns:a16="http://schemas.microsoft.com/office/drawing/2014/main" id="{DC3AE5ED-71AB-BA47-B3B6-2060B145A0CF}"/>
+              </a:ext>
+            </a:extLst>
+          </p:cNvPr>
+          <p:cNvSpPr>
+            <a:spLocks noGrp="1"/>
+          </p:cNvSpPr>
+          <p:nvPr>
+            <p:ph type="title"/>
+          </p:nvPr>
+        </p:nvSpPr>
+        <p:spPr>
+          <a:xfrm>
+            <a:off x="265077" y="137495"/>
+            <a:ext cx="3979205" cy="1453363"/>
+          </a:xfrm>
+        </p:spPr>
+        <p:txBody>
+          <a:bodyPr>
+            <a:normAutofit/>
+          </a:bodyPr>
+          <a:lstStyle/>
+          <a:p>
+            <a:r>
+              <a:rPr lang="en-US" dirty="0"/>
+              <a:t>Pointers and array</a:t>
+            </a:r>
+          </a:p>
+        </p:txBody>
+      </p:sp>
+      <p:sp>
+        <p:nvSpPr>
+          <p:cNvPr id="3" name="Content Placeholder 2">
+            <a:extLst>
+              <a:ext uri="{FF2B5EF4-FFF2-40B4-BE49-F238E27FC236}">
+                <a16:creationId xmlns:a16="http://schemas.microsoft.com/office/drawing/2014/main" id="{0CE04AD8-F0D3-3246-96C8-A7A2956281C3}"/>
+              </a:ext>
+            </a:extLst>
+          </p:cNvPr>
+          <p:cNvSpPr>
+            <a:spLocks noGrp="1"/>
+          </p:cNvSpPr>
+          <p:nvPr>
+            <p:ph idx="1"/>
+          </p:nvPr>
+        </p:nvSpPr>
+        <p:spPr>
+          <a:xfrm>
+            <a:off x="802178" y="2261420"/>
+            <a:ext cx="4002936" cy="3637935"/>
+          </a:xfrm>
+        </p:spPr>
+        <p:txBody>
+          <a:bodyPr>
+            <a:normAutofit/>
+          </a:bodyPr>
+          <a:lstStyle/>
+          <a:p>
+            <a:pPr>
+              <a:lnSpc>
+                <a:spcPct val="90000"/>
+              </a:lnSpc>
+            </a:pPr>
+            <a:r>
+              <a:rPr lang="en-US" sz="1500" dirty="0"/>
+              <a:t>Up until this point we have just set </a:t>
+            </a:r>
+            <a:r>
+              <a:rPr lang="en-US" sz="1500" dirty="0">
+                <a:solidFill>
+                  <a:srgbClr val="FFC000"/>
+                </a:solidFill>
+              </a:rPr>
+              <a:t>pointers to </a:t>
+            </a:r>
+            <a:r>
+              <a:rPr lang="en-US" sz="1500" dirty="0" err="1">
+                <a:solidFill>
+                  <a:srgbClr val="FFC000"/>
+                </a:solidFill>
+              </a:rPr>
+              <a:t>ints</a:t>
+            </a:r>
+            <a:r>
+              <a:rPr lang="en-US" sz="1500" dirty="0">
+                <a:solidFill>
+                  <a:srgbClr val="FFC000"/>
+                </a:solidFill>
+              </a:rPr>
+              <a:t>/doubles/</a:t>
+            </a:r>
+            <a:r>
+              <a:rPr lang="en-US" sz="1500" dirty="0" err="1">
+                <a:solidFill>
+                  <a:srgbClr val="FFC000"/>
+                </a:solidFill>
+              </a:rPr>
+              <a:t>etc</a:t>
+            </a:r>
+            <a:endParaRPr lang="en-US" sz="1500" dirty="0">
+              <a:solidFill>
+                <a:srgbClr val="FFC000"/>
+              </a:solidFill>
+            </a:endParaRPr>
+          </a:p>
+          <a:p>
+            <a:pPr>
+              <a:lnSpc>
+                <a:spcPct val="90000"/>
+              </a:lnSpc>
+            </a:pPr>
+            <a:r>
+              <a:rPr lang="en-US" sz="1500" dirty="0"/>
+              <a:t>Now we will be setting </a:t>
+            </a:r>
+            <a:r>
+              <a:rPr lang="en-US" sz="1500" dirty="0">
+                <a:solidFill>
+                  <a:srgbClr val="FFC000"/>
+                </a:solidFill>
+              </a:rPr>
+              <a:t>pointer to element in the array</a:t>
+            </a:r>
+            <a:r>
+              <a:rPr lang="en-US" sz="1500" dirty="0"/>
+              <a:t> (not pointer to array, that is considered wrong)</a:t>
+            </a:r>
+          </a:p>
+          <a:p>
+            <a:pPr lvl="1">
+              <a:lnSpc>
+                <a:spcPct val="90000"/>
+              </a:lnSpc>
+            </a:pPr>
+            <a:r>
+              <a:rPr lang="en-US" sz="1500" dirty="0"/>
+              <a:t>The pointer is meant to access the first, second, third, etc. elements in the array</a:t>
+            </a:r>
+          </a:p>
+          <a:p>
+            <a:pPr lvl="1">
+              <a:lnSpc>
+                <a:spcPct val="90000"/>
+              </a:lnSpc>
+            </a:pPr>
+            <a:r>
+              <a:rPr lang="en-US" sz="1500" dirty="0"/>
+              <a:t>We cannot point to the entire array, only to an element in the array (normally the first one)</a:t>
+            </a:r>
+          </a:p>
+          <a:p>
+            <a:pPr>
+              <a:lnSpc>
+                <a:spcPct val="90000"/>
+              </a:lnSpc>
+            </a:pPr>
+            <a:r>
+              <a:rPr lang="en-US" sz="1500" dirty="0"/>
+              <a:t>Arrays are already pointers by definition so technically line 3 will work without using the Address Of Operator</a:t>
+            </a:r>
+          </a:p>
+          <a:p>
+            <a:pPr>
+              <a:lnSpc>
+                <a:spcPct val="90000"/>
+              </a:lnSpc>
+            </a:pPr>
+            <a:r>
+              <a:rPr lang="en-US" sz="1500" dirty="0"/>
+              <a:t>You can still use the Address Of operator, see line 4</a:t>
+            </a:r>
+          </a:p>
+          <a:p>
+            <a:pPr>
+              <a:lnSpc>
+                <a:spcPct val="90000"/>
+              </a:lnSpc>
+            </a:pPr>
+            <a:r>
+              <a:rPr lang="en-US" sz="1500" dirty="0"/>
+              <a:t>Both manners will give the same first value</a:t>
+            </a:r>
+          </a:p>
+          <a:p>
+            <a:pPr>
+              <a:lnSpc>
+                <a:spcPct val="90000"/>
+              </a:lnSpc>
+            </a:pPr>
+            <a:r>
+              <a:rPr lang="en-US" sz="1500" dirty="0"/>
+              <a:t>Technically x == &amp;x[0] since we are always being given the first slot</a:t>
+            </a:r>
+          </a:p>
+        </p:txBody>
+      </p:sp>
+      <p:pic>
+        <p:nvPicPr>
+          <p:cNvPr id="5" name="Picture 4" descr="Text&#10;&#10;Description automatically generated">
+            <a:extLst>
+              <a:ext uri="{FF2B5EF4-FFF2-40B4-BE49-F238E27FC236}">
+                <a16:creationId xmlns:a16="http://schemas.microsoft.com/office/drawing/2014/main" id="{FADC8120-154E-0F40-BE8C-A6B76280837D}"/>
+              </a:ext>
+            </a:extLst>
+          </p:cNvPr>
+          <p:cNvPicPr>
+            <a:picLocks noChangeAspect="1"/>
+          </p:cNvPicPr>
+          <p:nvPr/>
+        </p:nvPicPr>
+        <p:blipFill>
+          <a:blip r:embed="rId3"/>
+          <a:stretch>
+            <a:fillRect/>
+          </a:stretch>
+        </p:blipFill>
+        <p:spPr>
+          <a:xfrm>
+            <a:off x="5289752" y="1222046"/>
+            <a:ext cx="6095593" cy="4251676"/>
+          </a:xfrm>
+          <a:prstGeom prst="roundRect">
+            <a:avLst>
+              <a:gd name="adj" fmla="val 4380"/>
+            </a:avLst>
+          </a:prstGeom>
+          <a:ln w="50800" cap="sq" cmpd="dbl">
+            <a:gradFill flip="none" rotWithShape="1">
+              <a:gsLst>
+                <a:gs pos="0">
+                  <a:srgbClr val="FFFFFF"/>
+                </a:gs>
+                <a:gs pos="100000">
+                  <a:schemeClr val="tx1">
+                    <a:alpha val="0"/>
+                  </a:schemeClr>
+                </a:gs>
+              </a:gsLst>
+              <a:path path="circle">
+                <a:fillToRect l="50000" t="50000" r="50000" b="50000"/>
+              </a:path>
+              <a:tileRect/>
+            </a:gradFill>
+            <a:miter lim="800000"/>
+          </a:ln>
+          <a:effectLst>
+            <a:outerShdw blurRad="254000" algn="tl" rotWithShape="0">
+              <a:srgbClr val="000000">
+                <a:alpha val="43000"/>
+              </a:srgbClr>
+            </a:outerShdw>
+          </a:effectLst>
+        </p:spPr>
+      </p:pic>
+    </p:spTree>
+    <p:extLst>
+      <p:ext uri="{BB962C8B-B14F-4D97-AF65-F5344CB8AC3E}">
+        <p14:creationId xmlns:p14="http://schemas.microsoft.com/office/powerpoint/2010/main" val="386138672"/>
+      </p:ext>
+    </p:extLst>
+  </p:cSld>
+  <p:clrMapOvr>
+    <a:masterClrMapping/>
+  </p:clrMapOvr>
+</p:sld>
+</file>
+
+<file path=ppt/slides/slide17.xml><?xml version="1.0" encoding="utf-8"?>
+<p:sld xmlns:a="http://schemas.openxmlformats.org/drawingml/2006/main" xmlns:r="http://schemas.openxmlformats.org/officeDocument/2006/relationships" xmlns:p="http://schemas.openxmlformats.org/presentationml/2006/main">
+  <p:cSld>
+    <p:bg>
+      <p:bgPr>
+        <a:blipFill>
+          <a:blip r:embed="rId2"/>
+          <a:stretch/>
+        </a:blipFill>
+        <a:effectLst/>
+      </p:bgPr>
+    </p:bg>
+    <p:spTree>
+      <p:nvGrpSpPr>
+        <p:cNvPr id="1" name=""/>
+        <p:cNvGrpSpPr/>
+        <p:nvPr/>
+      </p:nvGrpSpPr>
+      <p:grpSpPr>
+        <a:xfrm>
+          <a:off x="0" y="0"/>
+          <a:ext cx="0" cy="0"/>
+          <a:chOff x="0" y="0"/>
+          <a:chExt cx="0" cy="0"/>
+        </a:xfrm>
+      </p:grpSpPr>
+      <p:sp>
+        <p:nvSpPr>
+          <p:cNvPr id="2" name="Title 1">
+            <a:extLst>
+              <a:ext uri="{FF2B5EF4-FFF2-40B4-BE49-F238E27FC236}">
+                <a16:creationId xmlns:a16="http://schemas.microsoft.com/office/drawing/2014/main" id="{3BFD5426-68B6-3047-85D6-96E9ADEC8595}"/>
+              </a:ext>
+            </a:extLst>
+          </p:cNvPr>
+          <p:cNvSpPr>
+            <a:spLocks noGrp="1"/>
+          </p:cNvSpPr>
+          <p:nvPr>
+            <p:ph type="title"/>
+          </p:nvPr>
+        </p:nvSpPr>
+        <p:spPr>
+          <a:xfrm>
+            <a:off x="557685" y="343334"/>
+            <a:ext cx="3979205" cy="1453363"/>
+          </a:xfrm>
+        </p:spPr>
+        <p:txBody>
+          <a:bodyPr>
+            <a:normAutofit/>
+          </a:bodyPr>
+          <a:lstStyle/>
+          <a:p>
+            <a:r>
+              <a:rPr lang="en-US" sz="3300" dirty="0"/>
+              <a:t>Pointers and arrays (accessing)</a:t>
+            </a:r>
+          </a:p>
+        </p:txBody>
+      </p:sp>
+      <p:sp>
+        <p:nvSpPr>
+          <p:cNvPr id="3" name="Content Placeholder 2">
+            <a:extLst>
+              <a:ext uri="{FF2B5EF4-FFF2-40B4-BE49-F238E27FC236}">
+                <a16:creationId xmlns:a16="http://schemas.microsoft.com/office/drawing/2014/main" id="{7F96443D-AAF0-084B-ABCE-486B880418A4}"/>
+              </a:ext>
+            </a:extLst>
+          </p:cNvPr>
+          <p:cNvSpPr>
+            <a:spLocks noGrp="1"/>
+          </p:cNvSpPr>
+          <p:nvPr>
+            <p:ph idx="1"/>
+          </p:nvPr>
+        </p:nvSpPr>
+        <p:spPr>
+          <a:xfrm>
+            <a:off x="533954" y="1907852"/>
+            <a:ext cx="4002936" cy="4456372"/>
+          </a:xfrm>
+        </p:spPr>
+        <p:txBody>
+          <a:bodyPr>
+            <a:normAutofit/>
+          </a:bodyPr>
+          <a:lstStyle/>
+          <a:p>
+            <a:r>
+              <a:rPr lang="en-US" dirty="0"/>
+              <a:t>In the example we set an int array x with 5 values 1,200,3,4,5</a:t>
+            </a:r>
+          </a:p>
+          <a:p>
+            <a:r>
+              <a:rPr lang="en-US" dirty="0"/>
+              <a:t>We set pointer to the first element in the array</a:t>
+            </a:r>
+          </a:p>
+          <a:p>
+            <a:r>
+              <a:rPr lang="en-US" dirty="0"/>
+              <a:t>We can access the next elements by incrementing the pointer by 1</a:t>
+            </a:r>
+          </a:p>
+          <a:p>
+            <a:pPr lvl="1"/>
+            <a:r>
+              <a:rPr lang="en-US" dirty="0"/>
+              <a:t>Can be done in a loop as well</a:t>
+            </a:r>
+          </a:p>
+          <a:p>
+            <a:r>
+              <a:rPr lang="en-US" dirty="0"/>
+              <a:t>”Adding 1”to the </a:t>
+            </a:r>
+            <a:r>
+              <a:rPr lang="en-US" dirty="0" err="1"/>
+              <a:t>ptrX</a:t>
+            </a:r>
+            <a:r>
+              <a:rPr lang="en-US" dirty="0"/>
+              <a:t>  (without “*</a:t>
+            </a:r>
+            <a:r>
+              <a:rPr lang="en-US" dirty="0">
+                <a:sym typeface="Wingdings" pitchFamily="2" charset="2"/>
+              </a:rPr>
+              <a:t>”) </a:t>
+            </a:r>
+            <a:r>
+              <a:rPr lang="en-US" dirty="0"/>
+              <a:t>adds 4 bytes to the memory address  for example</a:t>
+            </a:r>
+          </a:p>
+          <a:p>
+            <a:pPr lvl="1"/>
+            <a:r>
+              <a:rPr lang="en-US" dirty="0" err="1">
+                <a:solidFill>
+                  <a:srgbClr val="00B050"/>
+                </a:solidFill>
+              </a:rPr>
+              <a:t>ptrX</a:t>
+            </a:r>
+            <a:r>
+              <a:rPr lang="en-US" dirty="0"/>
+              <a:t>: </a:t>
+            </a:r>
+            <a:r>
+              <a:rPr lang="en-US" dirty="0">
+                <a:solidFill>
+                  <a:srgbClr val="FFC000"/>
+                </a:solidFill>
+              </a:rPr>
+              <a:t>0x7ffee7d3e710</a:t>
+            </a:r>
+          </a:p>
+          <a:p>
+            <a:pPr lvl="1"/>
+            <a:r>
+              <a:rPr lang="en-US" dirty="0" err="1">
+                <a:solidFill>
+                  <a:srgbClr val="00B050"/>
+                </a:solidFill>
+              </a:rPr>
+              <a:t>ptrX</a:t>
+            </a:r>
+            <a:r>
+              <a:rPr lang="en-US" dirty="0"/>
+              <a:t> + 1: </a:t>
+            </a:r>
+            <a:r>
+              <a:rPr lang="en-US" dirty="0">
+                <a:solidFill>
+                  <a:srgbClr val="FFC000"/>
+                </a:solidFill>
+              </a:rPr>
+              <a:t>0x7ffee7d3e714</a:t>
+            </a:r>
+          </a:p>
+          <a:p>
+            <a:pPr lvl="1"/>
+            <a:r>
+              <a:rPr lang="en-US" dirty="0"/>
+              <a:t>…</a:t>
+            </a:r>
+          </a:p>
+          <a:p>
+            <a:r>
+              <a:rPr lang="en-US" dirty="0"/>
+              <a:t>Each element in the array is just another address</a:t>
+            </a:r>
+          </a:p>
+        </p:txBody>
+      </p:sp>
+      <p:pic>
+        <p:nvPicPr>
+          <p:cNvPr id="21" name="Picture 20" descr="Text&#10;&#10;Description automatically generated">
+            <a:extLst>
+              <a:ext uri="{FF2B5EF4-FFF2-40B4-BE49-F238E27FC236}">
+                <a16:creationId xmlns:a16="http://schemas.microsoft.com/office/drawing/2014/main" id="{178D7B5D-24E5-A849-B49B-AE6FE716BEB7}"/>
+              </a:ext>
+            </a:extLst>
+          </p:cNvPr>
+          <p:cNvPicPr>
+            <a:picLocks noChangeAspect="1"/>
+          </p:cNvPicPr>
+          <p:nvPr/>
+        </p:nvPicPr>
+        <p:blipFill>
+          <a:blip r:embed="rId3"/>
+          <a:stretch>
+            <a:fillRect/>
+          </a:stretch>
+        </p:blipFill>
+        <p:spPr>
+          <a:xfrm>
+            <a:off x="5987546" y="-91638"/>
+            <a:ext cx="6533148" cy="3776670"/>
+          </a:xfrm>
+          <a:prstGeom prst="rect">
+            <a:avLst/>
+          </a:prstGeom>
+        </p:spPr>
+      </p:pic>
+      <p:pic>
+        <p:nvPicPr>
+          <p:cNvPr id="23" name="Picture 22" descr="A picture containing text&#10;&#10;Description automatically generated">
+            <a:extLst>
+              <a:ext uri="{FF2B5EF4-FFF2-40B4-BE49-F238E27FC236}">
+                <a16:creationId xmlns:a16="http://schemas.microsoft.com/office/drawing/2014/main" id="{8E3E25BF-BA8A-3E40-89E9-6F94B59DBBB1}"/>
+              </a:ext>
+            </a:extLst>
+          </p:cNvPr>
+          <p:cNvPicPr>
+            <a:picLocks noChangeAspect="1"/>
+          </p:cNvPicPr>
+          <p:nvPr/>
+        </p:nvPicPr>
+        <p:blipFill>
+          <a:blip r:embed="rId4"/>
+          <a:stretch>
+            <a:fillRect/>
+          </a:stretch>
+        </p:blipFill>
+        <p:spPr>
+          <a:xfrm>
+            <a:off x="7386888" y="2657856"/>
+            <a:ext cx="3697074" cy="4602480"/>
+          </a:xfrm>
+          <a:prstGeom prst="rect">
+            <a:avLst/>
+          </a:prstGeom>
+        </p:spPr>
+      </p:pic>
+    </p:spTree>
+    <p:extLst>
+      <p:ext uri="{BB962C8B-B14F-4D97-AF65-F5344CB8AC3E}">
+        <p14:creationId xmlns:p14="http://schemas.microsoft.com/office/powerpoint/2010/main" val="2817022085"/>
+      </p:ext>
+    </p:extLst>
+  </p:cSld>
+  <p:clrMapOvr>
+    <a:masterClrMapping/>
+  </p:clrMapOvr>
+</p:sld>
+</file>
+
+<file path=ppt/slides/slide18.xml><?xml version="1.0" encoding="utf-8"?>
 <p:sld xmlns:a="http://schemas.openxmlformats.org/drawingml/2006/main" xmlns:r="http://schemas.openxmlformats.org/officeDocument/2006/relationships" xmlns:p="http://schemas.openxmlformats.org/presentationml/2006/main">
   <p:cSld>
     <p:spTree>
@@ -8604,7 +9648,7 @@
           <p:cNvPr id="2" name="Title 1">
             <a:extLst>
               <a:ext uri="{FF2B5EF4-FFF2-40B4-BE49-F238E27FC236}">
-                <a16:creationId xmlns:a16="http://schemas.microsoft.com/office/drawing/2014/main" id="{85A78A2E-1182-6147-AD4D-68EB9ADCB987}"/>
+                <a16:creationId xmlns:a16="http://schemas.microsoft.com/office/drawing/2014/main" id="{23CF30FF-C158-B14C-9333-4426E81E4A62}"/>
               </a:ext>
             </a:extLst>
           </p:cNvPr>
@@ -8615,14 +9659,19 @@
             <p:ph type="title"/>
           </p:nvPr>
         </p:nvSpPr>
-        <p:spPr/>
+        <p:spPr>
+          <a:xfrm>
+            <a:off x="685801" y="609600"/>
+            <a:ext cx="4787301" cy="1456267"/>
+          </a:xfrm>
+        </p:spPr>
         <p:txBody>
           <a:bodyPr/>
           <a:lstStyle/>
           <a:p>
             <a:r>
               <a:rPr lang="en-US" dirty="0"/>
-              <a:t>References</a:t>
+              <a:t>Pointers and arrays (modifying)</a:t>
             </a:r>
           </a:p>
         </p:txBody>
@@ -8632,7 +9681,7 @@
           <p:cNvPr id="3" name="Content Placeholder 2">
             <a:extLst>
               <a:ext uri="{FF2B5EF4-FFF2-40B4-BE49-F238E27FC236}">
-                <a16:creationId xmlns:a16="http://schemas.microsoft.com/office/drawing/2014/main" id="{0523291A-621D-874D-8E8A-10E7A5750E3B}"/>
+                <a16:creationId xmlns:a16="http://schemas.microsoft.com/office/drawing/2014/main" id="{11E82DFA-84A8-E748-AC87-9E21BE480D16}"/>
               </a:ext>
             </a:extLst>
           </p:cNvPr>
@@ -8645,8 +9694,8 @@
         </p:nvSpPr>
         <p:spPr>
           <a:xfrm>
-            <a:off x="563881" y="3633216"/>
-            <a:ext cx="10131425" cy="2852928"/>
+            <a:off x="685801" y="2142067"/>
+            <a:ext cx="5227319" cy="3649133"/>
           </a:xfrm>
         </p:spPr>
         <p:txBody>
@@ -8654,85 +9703,203 @@
           <a:lstStyle/>
           <a:p>
             <a:r>
-              <a:rPr lang="en-US" dirty="0">
-                <a:hlinkClick r:id="rId3"/>
-              </a:rPr>
-              <a:t>https://www.programiz.com/c-programming/c-pointers</a:t>
-            </a:r>
+              <a:rPr lang="en-US" dirty="0"/>
+              <a:t>Modification occurs at line 4</a:t>
+            </a:r>
+          </a:p>
+          <a:p>
+            <a:r>
+              <a:rPr lang="en-US" dirty="0"/>
+              <a:t>It’s more or less the same, you must go to that specific block/address and assign it a new value</a:t>
+            </a:r>
+          </a:p>
+          <a:p>
+            <a:pPr lvl="1"/>
+            <a:r>
+              <a:rPr lang="en-US" dirty="0"/>
+              <a:t>Can also modify entire array through loop</a:t>
+            </a:r>
+          </a:p>
+          <a:p>
             <a:endParaRPr lang="en-US" dirty="0"/>
           </a:p>
-          <a:p>
-            <a:r>
-              <a:rPr lang="en-US" dirty="0">
-                <a:hlinkClick r:id="rId4"/>
-              </a:rPr>
-              <a:t>https://www.freecodecamp.org/news/the-c-beginners-handbook/#pointers</a:t>
-            </a:r>
-            <a:endParaRPr lang="en-US" dirty="0"/>
-          </a:p>
-          <a:p>
-            <a:r>
-              <a:rPr lang="en-US" dirty="0">
-                <a:hlinkClick r:id="rId5"/>
-              </a:rPr>
-              <a:t>https://denniskubes.com/2012/08/17/basics-of-memory-addresses-in-c/</a:t>
-            </a:r>
-            <a:endParaRPr lang="en-US" dirty="0"/>
-          </a:p>
-          <a:p>
-            <a:r>
-              <a:rPr lang="en-US" dirty="0">
-                <a:hlinkClick r:id="rId6"/>
-              </a:rPr>
-              <a:t>https://computer.howstuffworks.com/c23.htm</a:t>
-            </a:r>
-            <a:endParaRPr lang="en-US" dirty="0"/>
-          </a:p>
-          <a:p>
-            <a:r>
-              <a:rPr lang="en-US" dirty="0">
-                <a:hlinkClick r:id="rId7"/>
-              </a:rPr>
-              <a:t>http://www.cs.ecu.edu/karl/3300/spr14/Notes/C/Memory/memory.html#:~:text=A%20memory%20address%20is%20called,type%20of%20the%20executable%20program</a:t>
-            </a:r>
-            <a:r>
-              <a:rPr lang="en-US" dirty="0"/>
-              <a:t>).</a:t>
-            </a:r>
-          </a:p>
-          <a:p>
-            <a:endParaRPr lang="en-US" dirty="0"/>
-          </a:p>
-          <a:p>
-            <a:endParaRPr lang="en-US" dirty="0"/>
-          </a:p>
-          <a:p>
-            <a:endParaRPr lang="en-US" dirty="0"/>
-          </a:p>
-          <a:p>
-            <a:endParaRPr lang="en-US" dirty="0"/>
-          </a:p>
-          <a:p>
-            <a:endParaRPr lang="en-US" dirty="0"/>
-          </a:p>
-          <a:p>
-            <a:endParaRPr lang="en-US" dirty="0"/>
-          </a:p>
-          <a:p>
-            <a:endParaRPr lang="en-US" dirty="0"/>
-          </a:p>
-          <a:p>
-            <a:endParaRPr lang="en-US" dirty="0"/>
-          </a:p>
-          <a:p>
-            <a:endParaRPr lang="en-US" dirty="0"/>
-          </a:p>
-        </p:txBody>
-      </p:sp>
+        </p:txBody>
+      </p:sp>
+      <p:pic>
+        <p:nvPicPr>
+          <p:cNvPr id="5" name="Picture 4" descr="Text&#10;&#10;Description automatically generated">
+            <a:extLst>
+              <a:ext uri="{FF2B5EF4-FFF2-40B4-BE49-F238E27FC236}">
+                <a16:creationId xmlns:a16="http://schemas.microsoft.com/office/drawing/2014/main" id="{2DBAA192-969B-FE46-8F2B-FCC1B0606CFC}"/>
+              </a:ext>
+            </a:extLst>
+          </p:cNvPr>
+          <p:cNvPicPr>
+            <a:picLocks noChangeAspect="1"/>
+          </p:cNvPicPr>
+          <p:nvPr/>
+        </p:nvPicPr>
+        <p:blipFill>
+          <a:blip r:embed="rId2"/>
+          <a:stretch>
+            <a:fillRect/>
+          </a:stretch>
+        </p:blipFill>
+        <p:spPr>
+          <a:xfrm>
+            <a:off x="7157781" y="-5590"/>
+            <a:ext cx="5105462" cy="4236213"/>
+          </a:xfrm>
+          <a:prstGeom prst="rect">
+            <a:avLst/>
+          </a:prstGeom>
+        </p:spPr>
+      </p:pic>
+      <p:pic>
+        <p:nvPicPr>
+          <p:cNvPr id="7" name="Picture 6" descr="A picture containing text&#10;&#10;Description automatically generated">
+            <a:extLst>
+              <a:ext uri="{FF2B5EF4-FFF2-40B4-BE49-F238E27FC236}">
+                <a16:creationId xmlns:a16="http://schemas.microsoft.com/office/drawing/2014/main" id="{92445FFA-F0A6-BD47-8E94-48B1EBDAF082}"/>
+              </a:ext>
+            </a:extLst>
+          </p:cNvPr>
+          <p:cNvPicPr>
+            <a:picLocks noChangeAspect="1"/>
+          </p:cNvPicPr>
+          <p:nvPr/>
+        </p:nvPicPr>
+        <p:blipFill>
+          <a:blip r:embed="rId3"/>
+          <a:stretch>
+            <a:fillRect/>
+          </a:stretch>
+        </p:blipFill>
+        <p:spPr>
+          <a:xfrm>
+            <a:off x="8319376" y="3599615"/>
+            <a:ext cx="2782272" cy="3477840"/>
+          </a:xfrm>
+          <a:prstGeom prst="rect">
+            <a:avLst/>
+          </a:prstGeom>
+        </p:spPr>
+      </p:pic>
     </p:spTree>
     <p:extLst>
       <p:ext uri="{BB962C8B-B14F-4D97-AF65-F5344CB8AC3E}">
-        <p14:creationId xmlns:p14="http://schemas.microsoft.com/office/powerpoint/2010/main" val="867669438"/>
+        <p14:creationId xmlns:p14="http://schemas.microsoft.com/office/powerpoint/2010/main" val="2423274764"/>
+      </p:ext>
+    </p:extLst>
+  </p:cSld>
+  <p:clrMapOvr>
+    <a:masterClrMapping/>
+  </p:clrMapOvr>
+</p:sld>
+</file>
+
+<file path=ppt/slides/slide19.xml><?xml version="1.0" encoding="utf-8"?>
+<p:sld xmlns:a="http://schemas.openxmlformats.org/drawingml/2006/main" xmlns:r="http://schemas.openxmlformats.org/officeDocument/2006/relationships" xmlns:p="http://schemas.openxmlformats.org/presentationml/2006/main">
+  <p:cSld>
+    <p:spTree>
+      <p:nvGrpSpPr>
+        <p:cNvPr id="1" name=""/>
+        <p:cNvGrpSpPr/>
+        <p:nvPr/>
+      </p:nvGrpSpPr>
+      <p:grpSpPr>
+        <a:xfrm>
+          <a:off x="0" y="0"/>
+          <a:ext cx="0" cy="0"/>
+          <a:chOff x="0" y="0"/>
+          <a:chExt cx="0" cy="0"/>
+        </a:xfrm>
+      </p:grpSpPr>
+      <p:sp>
+        <p:nvSpPr>
+          <p:cNvPr id="2" name="Title 1">
+            <a:extLst>
+              <a:ext uri="{FF2B5EF4-FFF2-40B4-BE49-F238E27FC236}">
+                <a16:creationId xmlns:a16="http://schemas.microsoft.com/office/drawing/2014/main" id="{D9BA95E7-94AC-1640-8E90-015CC2C279EE}"/>
+              </a:ext>
+            </a:extLst>
+          </p:cNvPr>
+          <p:cNvSpPr>
+            <a:spLocks noGrp="1"/>
+          </p:cNvSpPr>
+          <p:nvPr>
+            <p:ph type="title"/>
+          </p:nvPr>
+        </p:nvSpPr>
+        <p:spPr/>
+        <p:txBody>
+          <a:bodyPr/>
+          <a:lstStyle/>
+          <a:p>
+            <a:r>
+              <a:rPr lang="en-US" dirty="0"/>
+              <a:t>Pointers and functions</a:t>
+            </a:r>
+          </a:p>
+        </p:txBody>
+      </p:sp>
+      <p:sp>
+        <p:nvSpPr>
+          <p:cNvPr id="3" name="Content Placeholder 2">
+            <a:extLst>
+              <a:ext uri="{FF2B5EF4-FFF2-40B4-BE49-F238E27FC236}">
+                <a16:creationId xmlns:a16="http://schemas.microsoft.com/office/drawing/2014/main" id="{D4296092-0F4F-7C4D-953E-89E1251A578D}"/>
+              </a:ext>
+            </a:extLst>
+          </p:cNvPr>
+          <p:cNvSpPr>
+            <a:spLocks noGrp="1"/>
+          </p:cNvSpPr>
+          <p:nvPr>
+            <p:ph idx="1"/>
+          </p:nvPr>
+        </p:nvSpPr>
+        <p:spPr/>
+        <p:txBody>
+          <a:bodyPr/>
+          <a:lstStyle/>
+          <a:p>
+            <a:r>
+              <a:rPr lang="en-US" dirty="0"/>
+              <a:t>At times, functions need to use/access/modify values at memory locations/addresses. </a:t>
+            </a:r>
+          </a:p>
+          <a:p>
+            <a:r>
+              <a:rPr lang="en-US" dirty="0"/>
+              <a:t>Passing in variables may not perform the action you want it</a:t>
+            </a:r>
+          </a:p>
+          <a:p>
+            <a:r>
+              <a:rPr lang="en-US" dirty="0"/>
+              <a:t>In order to do this, the function definition must accept pointer parameters</a:t>
+            </a:r>
+          </a:p>
+          <a:p>
+            <a:r>
+              <a:rPr lang="en-US" dirty="0"/>
+              <a:t>Next slide presents an two examples. One with pointers being used in the function and the other without pointers in the function. The whole point of the examples are that if you feed it your salary and bonus, then it’ll give you the total.</a:t>
+            </a:r>
+          </a:p>
+          <a:p>
+            <a:pPr lvl="1"/>
+            <a:r>
+              <a:rPr lang="en-US" dirty="0"/>
+              <a:t>We will see how the use of pointers will give us the correct total and how the absence of pointers will give us the incorrect salary total</a:t>
+            </a:r>
+          </a:p>
+        </p:txBody>
+      </p:sp>
+    </p:spTree>
+    <p:extLst>
+      <p:ext uri="{BB962C8B-B14F-4D97-AF65-F5344CB8AC3E}">
+        <p14:creationId xmlns:p14="http://schemas.microsoft.com/office/powerpoint/2010/main" val="1421129285"/>
       </p:ext>
     </p:extLst>
   </p:cSld>
@@ -8775,7 +9942,12 @@
             <p:ph type="title"/>
           </p:nvPr>
         </p:nvSpPr>
-        <p:spPr/>
+        <p:spPr>
+          <a:xfrm>
+            <a:off x="539497" y="219456"/>
+            <a:ext cx="10131425" cy="1456267"/>
+          </a:xfrm>
+        </p:spPr>
         <p:txBody>
           <a:bodyPr/>
           <a:lstStyle/>
@@ -8803,7 +9975,12 @@
             <p:ph idx="1"/>
           </p:nvPr>
         </p:nvSpPr>
-        <p:spPr/>
+        <p:spPr>
+          <a:xfrm>
+            <a:off x="429769" y="2633472"/>
+            <a:ext cx="10131425" cy="2926080"/>
+          </a:xfrm>
+        </p:spPr>
         <p:txBody>
           <a:bodyPr>
             <a:normAutofit fontScale="92500" lnSpcReduction="10000"/>
@@ -8826,6 +10003,13 @@
             <a:pPr lvl="1"/>
             <a:r>
               <a:rPr lang="en-US" sz="2400" dirty="0"/>
+              <a:t>Address Of Operator</a:t>
+            </a:r>
+          </a:p>
+          <a:p>
+            <a:pPr lvl="1"/>
+            <a:r>
+              <a:rPr lang="en-US" sz="2400" dirty="0"/>
               <a:t>Pointers Overview</a:t>
             </a:r>
           </a:p>
@@ -8833,20 +10017,34 @@
             <a:pPr lvl="1"/>
             <a:r>
               <a:rPr lang="en-US" sz="2400" dirty="0"/>
-              <a:t>Diagram</a:t>
+              <a:t>Initializing/Accessing/Modifying Pointers</a:t>
             </a:r>
           </a:p>
           <a:p>
             <a:pPr lvl="1"/>
             <a:r>
               <a:rPr lang="en-US" sz="2400" dirty="0"/>
-              <a:t>Using basic pointers</a:t>
+              <a:t>Dereferencing</a:t>
             </a:r>
           </a:p>
           <a:p>
             <a:r>
               <a:rPr lang="en-US" sz="2800" dirty="0"/>
               <a:t>Pointers and Arrays</a:t>
+            </a:r>
+          </a:p>
+          <a:p>
+            <a:pPr lvl="1"/>
+            <a:r>
+              <a:rPr lang="en-US" sz="2600" dirty="0"/>
+              <a:t>Accessing</a:t>
+            </a:r>
+          </a:p>
+          <a:p>
+            <a:pPr lvl="1"/>
+            <a:r>
+              <a:rPr lang="en-US" sz="2600" dirty="0"/>
+              <a:t>Modifying</a:t>
             </a:r>
           </a:p>
           <a:p>
@@ -8866,7 +10064,1707 @@
     </p:spTree>
     <p:extLst>
       <p:ext uri="{BB962C8B-B14F-4D97-AF65-F5344CB8AC3E}">
-        <p14:creationId xmlns:p14="http://schemas.microsoft.com/office/powerpoint/2010/main" val="492067945"/>
+        <p14:creationId xmlns:p14="http://schemas.microsoft.com/office/powerpoint/2010/main" val="3248997508"/>
+      </p:ext>
+    </p:extLst>
+  </p:cSld>
+  <p:clrMapOvr>
+    <a:masterClrMapping/>
+  </p:clrMapOvr>
+</p:sld>
+</file>
+
+<file path=ppt/slides/slide20.xml><?xml version="1.0" encoding="utf-8"?>
+<p:sld xmlns:a="http://schemas.openxmlformats.org/drawingml/2006/main" xmlns:r="http://schemas.openxmlformats.org/officeDocument/2006/relationships" xmlns:p="http://schemas.openxmlformats.org/presentationml/2006/main">
+  <p:cSld>
+    <p:spTree>
+      <p:nvGrpSpPr>
+        <p:cNvPr id="1" name=""/>
+        <p:cNvGrpSpPr/>
+        <p:nvPr/>
+      </p:nvGrpSpPr>
+      <p:grpSpPr>
+        <a:xfrm>
+          <a:off x="0" y="0"/>
+          <a:ext cx="0" cy="0"/>
+          <a:chOff x="0" y="0"/>
+          <a:chExt cx="0" cy="0"/>
+        </a:xfrm>
+      </p:grpSpPr>
+      <p:pic>
+        <p:nvPicPr>
+          <p:cNvPr id="5" name="Picture 4" descr="Text&#10;&#10;Description automatically generated">
+            <a:extLst>
+              <a:ext uri="{FF2B5EF4-FFF2-40B4-BE49-F238E27FC236}">
+                <a16:creationId xmlns:a16="http://schemas.microsoft.com/office/drawing/2014/main" id="{44166465-C4E0-8548-82ED-86A8CD918C7D}"/>
+              </a:ext>
+            </a:extLst>
+          </p:cNvPr>
+          <p:cNvPicPr>
+            <a:picLocks noChangeAspect="1"/>
+          </p:cNvPicPr>
+          <p:nvPr/>
+        </p:nvPicPr>
+        <p:blipFill>
+          <a:blip r:embed="rId2"/>
+          <a:stretch>
+            <a:fillRect/>
+          </a:stretch>
+        </p:blipFill>
+        <p:spPr>
+          <a:xfrm>
+            <a:off x="-60960" y="-267476"/>
+            <a:ext cx="5315712" cy="5097855"/>
+          </a:xfrm>
+          <a:prstGeom prst="rect">
+            <a:avLst/>
+          </a:prstGeom>
+        </p:spPr>
+      </p:pic>
+      <p:pic>
+        <p:nvPicPr>
+          <p:cNvPr id="7" name="Picture 6" descr="Text&#10;&#10;Description automatically generated">
+            <a:extLst>
+              <a:ext uri="{FF2B5EF4-FFF2-40B4-BE49-F238E27FC236}">
+                <a16:creationId xmlns:a16="http://schemas.microsoft.com/office/drawing/2014/main" id="{D273253B-E250-1348-9C93-223575028DD4}"/>
+              </a:ext>
+            </a:extLst>
+          </p:cNvPr>
+          <p:cNvPicPr>
+            <a:picLocks noChangeAspect="1"/>
+          </p:cNvPicPr>
+          <p:nvPr/>
+        </p:nvPicPr>
+        <p:blipFill>
+          <a:blip r:embed="rId3"/>
+          <a:stretch>
+            <a:fillRect/>
+          </a:stretch>
+        </p:blipFill>
+        <p:spPr>
+          <a:xfrm>
+            <a:off x="-341376" y="4012638"/>
+            <a:ext cx="5876544" cy="2845362"/>
+          </a:xfrm>
+          <a:prstGeom prst="rect">
+            <a:avLst/>
+          </a:prstGeom>
+        </p:spPr>
+      </p:pic>
+      <p:pic>
+        <p:nvPicPr>
+          <p:cNvPr id="11" name="Picture 10" descr="Text&#10;&#10;Description automatically generated">
+            <a:extLst>
+              <a:ext uri="{FF2B5EF4-FFF2-40B4-BE49-F238E27FC236}">
+                <a16:creationId xmlns:a16="http://schemas.microsoft.com/office/drawing/2014/main" id="{FE9CE21E-57E7-2649-862A-9C09CF2D0BEE}"/>
+              </a:ext>
+            </a:extLst>
+          </p:cNvPr>
+          <p:cNvPicPr>
+            <a:picLocks noChangeAspect="1"/>
+          </p:cNvPicPr>
+          <p:nvPr/>
+        </p:nvPicPr>
+        <p:blipFill>
+          <a:blip r:embed="rId4"/>
+          <a:stretch>
+            <a:fillRect/>
+          </a:stretch>
+        </p:blipFill>
+        <p:spPr>
+          <a:xfrm>
+            <a:off x="5940787" y="4012638"/>
+            <a:ext cx="5876544" cy="2845362"/>
+          </a:xfrm>
+          <a:prstGeom prst="rect">
+            <a:avLst/>
+          </a:prstGeom>
+        </p:spPr>
+      </p:pic>
+      <p:pic>
+        <p:nvPicPr>
+          <p:cNvPr id="13" name="Picture 12" descr="Text&#10;&#10;Description automatically generated">
+            <a:extLst>
+              <a:ext uri="{FF2B5EF4-FFF2-40B4-BE49-F238E27FC236}">
+                <a16:creationId xmlns:a16="http://schemas.microsoft.com/office/drawing/2014/main" id="{A469DEE1-464A-C347-BEB6-2FB4EBFFF199}"/>
+              </a:ext>
+            </a:extLst>
+          </p:cNvPr>
+          <p:cNvPicPr>
+            <a:picLocks noChangeAspect="1"/>
+          </p:cNvPicPr>
+          <p:nvPr/>
+        </p:nvPicPr>
+        <p:blipFill>
+          <a:blip r:embed="rId5"/>
+          <a:stretch>
+            <a:fillRect/>
+          </a:stretch>
+        </p:blipFill>
+        <p:spPr>
+          <a:xfrm>
+            <a:off x="6221203" y="-267476"/>
+            <a:ext cx="5315712" cy="5097855"/>
+          </a:xfrm>
+          <a:prstGeom prst="rect">
+            <a:avLst/>
+          </a:prstGeom>
+        </p:spPr>
+      </p:pic>
+      <p:sp>
+        <p:nvSpPr>
+          <p:cNvPr id="14" name="Frame 13">
+            <a:extLst>
+              <a:ext uri="{FF2B5EF4-FFF2-40B4-BE49-F238E27FC236}">
+                <a16:creationId xmlns:a16="http://schemas.microsoft.com/office/drawing/2014/main" id="{11AE8BD3-E025-F949-90AD-5382A81CCAED}"/>
+              </a:ext>
+            </a:extLst>
+          </p:cNvPr>
+          <p:cNvSpPr/>
+          <p:nvPr/>
+        </p:nvSpPr>
+        <p:spPr>
+          <a:xfrm>
+            <a:off x="1060704" y="3194304"/>
+            <a:ext cx="2084832" cy="365760"/>
+          </a:xfrm>
+          <a:prstGeom prst="frame">
+            <a:avLst/>
+          </a:prstGeom>
+        </p:spPr>
+        <p:style>
+          <a:lnRef idx="2">
+            <a:schemeClr val="accent1">
+              <a:shade val="50000"/>
+            </a:schemeClr>
+          </a:lnRef>
+          <a:fillRef idx="1">
+            <a:schemeClr val="accent1"/>
+          </a:fillRef>
+          <a:effectRef idx="0">
+            <a:schemeClr val="accent1"/>
+          </a:effectRef>
+          <a:fontRef idx="minor">
+            <a:schemeClr val="lt1"/>
+          </a:fontRef>
+        </p:style>
+        <p:txBody>
+          <a:bodyPr rtlCol="0" anchor="ctr"/>
+          <a:lstStyle/>
+          <a:p>
+            <a:pPr algn="ctr"/>
+            <a:endParaRPr lang="en-US">
+              <a:solidFill>
+                <a:schemeClr val="tx1"/>
+              </a:solidFill>
+            </a:endParaRPr>
+          </a:p>
+        </p:txBody>
+      </p:sp>
+      <p:sp>
+        <p:nvSpPr>
+          <p:cNvPr id="15" name="Frame 14">
+            <a:extLst>
+              <a:ext uri="{FF2B5EF4-FFF2-40B4-BE49-F238E27FC236}">
+                <a16:creationId xmlns:a16="http://schemas.microsoft.com/office/drawing/2014/main" id="{B188BAB8-929F-8047-8610-C556ECFD2CF2}"/>
+              </a:ext>
+            </a:extLst>
+          </p:cNvPr>
+          <p:cNvSpPr/>
+          <p:nvPr/>
+        </p:nvSpPr>
+        <p:spPr>
+          <a:xfrm>
+            <a:off x="7327392" y="3230880"/>
+            <a:ext cx="2182368" cy="292608"/>
+          </a:xfrm>
+          <a:prstGeom prst="frame">
+            <a:avLst/>
+          </a:prstGeom>
+        </p:spPr>
+        <p:style>
+          <a:lnRef idx="2">
+            <a:schemeClr val="accent1">
+              <a:shade val="50000"/>
+            </a:schemeClr>
+          </a:lnRef>
+          <a:fillRef idx="1">
+            <a:schemeClr val="accent1"/>
+          </a:fillRef>
+          <a:effectRef idx="0">
+            <a:schemeClr val="accent1"/>
+          </a:effectRef>
+          <a:fontRef idx="minor">
+            <a:schemeClr val="lt1"/>
+          </a:fontRef>
+        </p:style>
+        <p:txBody>
+          <a:bodyPr rtlCol="0" anchor="ctr"/>
+          <a:lstStyle/>
+          <a:p>
+            <a:pPr algn="ctr"/>
+            <a:endParaRPr lang="en-US">
+              <a:solidFill>
+                <a:schemeClr val="tx1"/>
+              </a:solidFill>
+            </a:endParaRPr>
+          </a:p>
+        </p:txBody>
+      </p:sp>
+      <p:sp>
+        <p:nvSpPr>
+          <p:cNvPr id="17" name="Frame 16">
+            <a:extLst>
+              <a:ext uri="{FF2B5EF4-FFF2-40B4-BE49-F238E27FC236}">
+                <a16:creationId xmlns:a16="http://schemas.microsoft.com/office/drawing/2014/main" id="{31D7D612-655F-F34E-A9CB-D895BF092411}"/>
+              </a:ext>
+            </a:extLst>
+          </p:cNvPr>
+          <p:cNvSpPr/>
+          <p:nvPr/>
+        </p:nvSpPr>
+        <p:spPr>
+          <a:xfrm>
+            <a:off x="484397" y="500620"/>
+            <a:ext cx="3051283" cy="1242836"/>
+          </a:xfrm>
+          <a:prstGeom prst="frame">
+            <a:avLst/>
+          </a:prstGeom>
+        </p:spPr>
+        <p:style>
+          <a:lnRef idx="2">
+            <a:schemeClr val="accent1">
+              <a:shade val="50000"/>
+            </a:schemeClr>
+          </a:lnRef>
+          <a:fillRef idx="1">
+            <a:schemeClr val="accent1"/>
+          </a:fillRef>
+          <a:effectRef idx="0">
+            <a:schemeClr val="accent1"/>
+          </a:effectRef>
+          <a:fontRef idx="minor">
+            <a:schemeClr val="lt1"/>
+          </a:fontRef>
+        </p:style>
+        <p:txBody>
+          <a:bodyPr rtlCol="0" anchor="ctr"/>
+          <a:lstStyle/>
+          <a:p>
+            <a:pPr algn="ctr"/>
+            <a:endParaRPr lang="en-US">
+              <a:solidFill>
+                <a:schemeClr val="tx1"/>
+              </a:solidFill>
+            </a:endParaRPr>
+          </a:p>
+        </p:txBody>
+      </p:sp>
+      <p:sp>
+        <p:nvSpPr>
+          <p:cNvPr id="21" name="Frame 20">
+            <a:extLst>
+              <a:ext uri="{FF2B5EF4-FFF2-40B4-BE49-F238E27FC236}">
+                <a16:creationId xmlns:a16="http://schemas.microsoft.com/office/drawing/2014/main" id="{FF1FC78A-A9EE-9C4B-A6FA-4F708AA84933}"/>
+              </a:ext>
+            </a:extLst>
+          </p:cNvPr>
+          <p:cNvSpPr/>
+          <p:nvPr/>
+        </p:nvSpPr>
+        <p:spPr>
+          <a:xfrm>
+            <a:off x="6769373" y="500620"/>
+            <a:ext cx="3051283" cy="1242836"/>
+          </a:xfrm>
+          <a:prstGeom prst="frame">
+            <a:avLst/>
+          </a:prstGeom>
+        </p:spPr>
+        <p:style>
+          <a:lnRef idx="2">
+            <a:schemeClr val="accent1">
+              <a:shade val="50000"/>
+            </a:schemeClr>
+          </a:lnRef>
+          <a:fillRef idx="1">
+            <a:schemeClr val="accent1"/>
+          </a:fillRef>
+          <a:effectRef idx="0">
+            <a:schemeClr val="accent1"/>
+          </a:effectRef>
+          <a:fontRef idx="minor">
+            <a:schemeClr val="lt1"/>
+          </a:fontRef>
+        </p:style>
+        <p:txBody>
+          <a:bodyPr rtlCol="0" anchor="ctr"/>
+          <a:lstStyle/>
+          <a:p>
+            <a:pPr algn="ctr"/>
+            <a:endParaRPr lang="en-US">
+              <a:solidFill>
+                <a:schemeClr val="tx1"/>
+              </a:solidFill>
+            </a:endParaRPr>
+          </a:p>
+        </p:txBody>
+      </p:sp>
+    </p:spTree>
+    <p:extLst>
+      <p:ext uri="{BB962C8B-B14F-4D97-AF65-F5344CB8AC3E}">
+        <p14:creationId xmlns:p14="http://schemas.microsoft.com/office/powerpoint/2010/main" val="1359763512"/>
+      </p:ext>
+    </p:extLst>
+  </p:cSld>
+  <p:clrMapOvr>
+    <a:masterClrMapping/>
+  </p:clrMapOvr>
+</p:sld>
+</file>
+
+<file path=ppt/slides/slide21.xml><?xml version="1.0" encoding="utf-8"?>
+<p:sld xmlns:a="http://schemas.openxmlformats.org/drawingml/2006/main" xmlns:r="http://schemas.openxmlformats.org/officeDocument/2006/relationships" xmlns:p="http://schemas.openxmlformats.org/presentationml/2006/main">
+  <p:cSld>
+    <p:spTree>
+      <p:nvGrpSpPr>
+        <p:cNvPr id="1" name=""/>
+        <p:cNvGrpSpPr/>
+        <p:nvPr/>
+      </p:nvGrpSpPr>
+      <p:grpSpPr>
+        <a:xfrm>
+          <a:off x="0" y="0"/>
+          <a:ext cx="0" cy="0"/>
+          <a:chOff x="0" y="0"/>
+          <a:chExt cx="0" cy="0"/>
+        </a:xfrm>
+      </p:grpSpPr>
+      <p:sp>
+        <p:nvSpPr>
+          <p:cNvPr id="2" name="Title 1">
+            <a:extLst>
+              <a:ext uri="{FF2B5EF4-FFF2-40B4-BE49-F238E27FC236}">
+                <a16:creationId xmlns:a16="http://schemas.microsoft.com/office/drawing/2014/main" id="{A1C68A77-CB1E-0941-B808-D2BACC611DBB}"/>
+              </a:ext>
+            </a:extLst>
+          </p:cNvPr>
+          <p:cNvSpPr>
+            <a:spLocks noGrp="1"/>
+          </p:cNvSpPr>
+          <p:nvPr>
+            <p:ph type="title"/>
+          </p:nvPr>
+        </p:nvSpPr>
+        <p:spPr/>
+        <p:txBody>
+          <a:bodyPr/>
+          <a:lstStyle/>
+          <a:p>
+            <a:r>
+              <a:rPr lang="en-US" dirty="0"/>
+              <a:t>Memory Allocations</a:t>
+            </a:r>
+          </a:p>
+        </p:txBody>
+      </p:sp>
+      <p:sp>
+        <p:nvSpPr>
+          <p:cNvPr id="3" name="Content Placeholder 2">
+            <a:extLst>
+              <a:ext uri="{FF2B5EF4-FFF2-40B4-BE49-F238E27FC236}">
+                <a16:creationId xmlns:a16="http://schemas.microsoft.com/office/drawing/2014/main" id="{3913414A-9461-0C41-83AD-7230DBA4A9D8}"/>
+              </a:ext>
+            </a:extLst>
+          </p:cNvPr>
+          <p:cNvSpPr>
+            <a:spLocks noGrp="1"/>
+          </p:cNvSpPr>
+          <p:nvPr>
+            <p:ph idx="1"/>
+          </p:nvPr>
+        </p:nvSpPr>
+        <p:spPr/>
+        <p:txBody>
+          <a:bodyPr/>
+          <a:lstStyle/>
+          <a:p>
+            <a:r>
+              <a:rPr lang="en-US" dirty="0"/>
+              <a:t>Memory allocation functions consist of: malloc(), </a:t>
+            </a:r>
+            <a:r>
+              <a:rPr lang="en-US" dirty="0" err="1"/>
+              <a:t>calloc</a:t>
+            </a:r>
+            <a:r>
+              <a:rPr lang="en-US" dirty="0"/>
+              <a:t>(), free(), and </a:t>
+            </a:r>
+            <a:r>
+              <a:rPr lang="en-US" dirty="0" err="1"/>
+              <a:t>realloc</a:t>
+            </a:r>
+            <a:r>
+              <a:rPr lang="en-US" dirty="0"/>
+              <a:t>()</a:t>
+            </a:r>
+          </a:p>
+          <a:p>
+            <a:r>
+              <a:rPr lang="en-US" dirty="0"/>
+              <a:t>malloc and </a:t>
+            </a:r>
+            <a:r>
+              <a:rPr lang="en-US" dirty="0" err="1"/>
+              <a:t>calloc</a:t>
+            </a:r>
+            <a:r>
+              <a:rPr lang="en-US" dirty="0"/>
+              <a:t> return a pointer of void that needs to be casted into its appropriate type  </a:t>
+            </a:r>
+          </a:p>
+          <a:p>
+            <a:r>
+              <a:rPr lang="en-US" dirty="0" err="1"/>
+              <a:t>realloc</a:t>
+            </a:r>
+            <a:r>
+              <a:rPr lang="en-US" dirty="0"/>
+              <a:t>() returns a pointer</a:t>
+            </a:r>
+          </a:p>
+          <a:p>
+            <a:r>
+              <a:rPr lang="en-US" dirty="0"/>
+              <a:t>free() function frees allocated memory</a:t>
+            </a:r>
+          </a:p>
+          <a:p>
+            <a:r>
+              <a:rPr lang="en-US" dirty="0"/>
+              <a:t>Let’s check them out!</a:t>
+            </a:r>
+          </a:p>
+        </p:txBody>
+      </p:sp>
+    </p:spTree>
+    <p:extLst>
+      <p:ext uri="{BB962C8B-B14F-4D97-AF65-F5344CB8AC3E}">
+        <p14:creationId xmlns:p14="http://schemas.microsoft.com/office/powerpoint/2010/main" val="4183161943"/>
+      </p:ext>
+    </p:extLst>
+  </p:cSld>
+  <p:clrMapOvr>
+    <a:masterClrMapping/>
+  </p:clrMapOvr>
+</p:sld>
+</file>
+
+<file path=ppt/slides/slide22.xml><?xml version="1.0" encoding="utf-8"?>
+<p:sld xmlns:a="http://schemas.openxmlformats.org/drawingml/2006/main" xmlns:r="http://schemas.openxmlformats.org/officeDocument/2006/relationships" xmlns:p="http://schemas.openxmlformats.org/presentationml/2006/main">
+  <p:cSld>
+    <p:spTree>
+      <p:nvGrpSpPr>
+        <p:cNvPr id="1" name=""/>
+        <p:cNvGrpSpPr/>
+        <p:nvPr/>
+      </p:nvGrpSpPr>
+      <p:grpSpPr>
+        <a:xfrm>
+          <a:off x="0" y="0"/>
+          <a:ext cx="0" cy="0"/>
+          <a:chOff x="0" y="0"/>
+          <a:chExt cx="0" cy="0"/>
+        </a:xfrm>
+      </p:grpSpPr>
+      <p:sp>
+        <p:nvSpPr>
+          <p:cNvPr id="2" name="Title 1">
+            <a:extLst>
+              <a:ext uri="{FF2B5EF4-FFF2-40B4-BE49-F238E27FC236}">
+                <a16:creationId xmlns:a16="http://schemas.microsoft.com/office/drawing/2014/main" id="{3BC9AF7E-C3A3-AB4A-8957-2DFAFBFBA621}"/>
+              </a:ext>
+            </a:extLst>
+          </p:cNvPr>
+          <p:cNvSpPr>
+            <a:spLocks noGrp="1"/>
+          </p:cNvSpPr>
+          <p:nvPr>
+            <p:ph type="title"/>
+          </p:nvPr>
+        </p:nvSpPr>
+        <p:spPr/>
+        <p:txBody>
+          <a:bodyPr/>
+          <a:lstStyle/>
+          <a:p>
+            <a:r>
+              <a:rPr lang="en-US" dirty="0"/>
+              <a:t>Malloc(…)</a:t>
+            </a:r>
+          </a:p>
+        </p:txBody>
+      </p:sp>
+      <p:sp>
+        <p:nvSpPr>
+          <p:cNvPr id="3" name="Content Placeholder 2">
+            <a:extLst>
+              <a:ext uri="{FF2B5EF4-FFF2-40B4-BE49-F238E27FC236}">
+                <a16:creationId xmlns:a16="http://schemas.microsoft.com/office/drawing/2014/main" id="{AD2BAC1B-C182-6542-9BD1-81087885947F}"/>
+              </a:ext>
+            </a:extLst>
+          </p:cNvPr>
+          <p:cNvSpPr>
+            <a:spLocks noGrp="1"/>
+          </p:cNvSpPr>
+          <p:nvPr>
+            <p:ph idx="1"/>
+          </p:nvPr>
+        </p:nvSpPr>
+        <p:spPr>
+          <a:xfrm>
+            <a:off x="685801" y="2142067"/>
+            <a:ext cx="4971287" cy="3649133"/>
+          </a:xfrm>
+        </p:spPr>
+        <p:txBody>
+          <a:bodyPr/>
+          <a:lstStyle/>
+          <a:p>
+            <a:r>
+              <a:rPr lang="en-US" dirty="0"/>
+              <a:t>malloc stands for Memory Allocation</a:t>
+            </a:r>
+          </a:p>
+          <a:p>
+            <a:r>
+              <a:rPr lang="en-US" dirty="0"/>
+              <a:t>It reserves a block of memory of specified number of bytes</a:t>
+            </a:r>
+          </a:p>
+          <a:p>
+            <a:r>
+              <a:rPr lang="en-US" dirty="0"/>
+              <a:t>has memory uninitialized (nothing inside)</a:t>
+            </a:r>
+          </a:p>
+          <a:p>
+            <a:r>
+              <a:rPr lang="en-US" dirty="0"/>
+              <a:t>Returns pointer that needs to be casted</a:t>
+            </a:r>
+          </a:p>
+        </p:txBody>
+      </p:sp>
+      <p:pic>
+        <p:nvPicPr>
+          <p:cNvPr id="7" name="Picture 6" descr="Text&#10;&#10;Description automatically generated">
+            <a:extLst>
+              <a:ext uri="{FF2B5EF4-FFF2-40B4-BE49-F238E27FC236}">
+                <a16:creationId xmlns:a16="http://schemas.microsoft.com/office/drawing/2014/main" id="{96B87696-4A5E-F14E-A133-9598D69F04DD}"/>
+              </a:ext>
+            </a:extLst>
+          </p:cNvPr>
+          <p:cNvPicPr>
+            <a:picLocks noChangeAspect="1"/>
+          </p:cNvPicPr>
+          <p:nvPr/>
+        </p:nvPicPr>
+        <p:blipFill>
+          <a:blip r:embed="rId2"/>
+          <a:stretch>
+            <a:fillRect/>
+          </a:stretch>
+        </p:blipFill>
+        <p:spPr>
+          <a:xfrm>
+            <a:off x="7578725" y="2626699"/>
+            <a:ext cx="4067813" cy="4619788"/>
+          </a:xfrm>
+          <a:prstGeom prst="rect">
+            <a:avLst/>
+          </a:prstGeom>
+        </p:spPr>
+      </p:pic>
+      <p:pic>
+        <p:nvPicPr>
+          <p:cNvPr id="9" name="Picture 8" descr="Text&#10;&#10;Description automatically generated">
+            <a:extLst>
+              <a:ext uri="{FF2B5EF4-FFF2-40B4-BE49-F238E27FC236}">
+                <a16:creationId xmlns:a16="http://schemas.microsoft.com/office/drawing/2014/main" id="{F8D37BAE-6977-1B40-95DA-3B20BCADD408}"/>
+              </a:ext>
+            </a:extLst>
+          </p:cNvPr>
+          <p:cNvPicPr>
+            <a:picLocks noChangeAspect="1"/>
+          </p:cNvPicPr>
+          <p:nvPr/>
+        </p:nvPicPr>
+        <p:blipFill>
+          <a:blip r:embed="rId3"/>
+          <a:stretch>
+            <a:fillRect/>
+          </a:stretch>
+        </p:blipFill>
+        <p:spPr>
+          <a:xfrm>
+            <a:off x="6534914" y="1047958"/>
+            <a:ext cx="6155436" cy="2645418"/>
+          </a:xfrm>
+          <a:prstGeom prst="rect">
+            <a:avLst/>
+          </a:prstGeom>
+        </p:spPr>
+      </p:pic>
+      <p:pic>
+        <p:nvPicPr>
+          <p:cNvPr id="11" name="Picture 10" descr="Text&#10;&#10;Description automatically generated">
+            <a:extLst>
+              <a:ext uri="{FF2B5EF4-FFF2-40B4-BE49-F238E27FC236}">
+                <a16:creationId xmlns:a16="http://schemas.microsoft.com/office/drawing/2014/main" id="{83EFAD7C-2400-B44B-9CA2-9C228556256C}"/>
+              </a:ext>
+            </a:extLst>
+          </p:cNvPr>
+          <p:cNvPicPr>
+            <a:picLocks noChangeAspect="1"/>
+          </p:cNvPicPr>
+          <p:nvPr/>
+        </p:nvPicPr>
+        <p:blipFill>
+          <a:blip r:embed="rId4"/>
+          <a:stretch>
+            <a:fillRect/>
+          </a:stretch>
+        </p:blipFill>
+        <p:spPr>
+          <a:xfrm>
+            <a:off x="6401347" y="-628214"/>
+            <a:ext cx="6422567" cy="3157377"/>
+          </a:xfrm>
+          <a:prstGeom prst="rect">
+            <a:avLst/>
+          </a:prstGeom>
+        </p:spPr>
+      </p:pic>
+    </p:spTree>
+    <p:extLst>
+      <p:ext uri="{BB962C8B-B14F-4D97-AF65-F5344CB8AC3E}">
+        <p14:creationId xmlns:p14="http://schemas.microsoft.com/office/powerpoint/2010/main" val="745410598"/>
+      </p:ext>
+    </p:extLst>
+  </p:cSld>
+  <p:clrMapOvr>
+    <a:masterClrMapping/>
+  </p:clrMapOvr>
+</p:sld>
+</file>
+
+<file path=ppt/slides/slide23.xml><?xml version="1.0" encoding="utf-8"?>
+<p:sld xmlns:a="http://schemas.openxmlformats.org/drawingml/2006/main" xmlns:r="http://schemas.openxmlformats.org/officeDocument/2006/relationships" xmlns:p="http://schemas.openxmlformats.org/presentationml/2006/main">
+  <p:cSld>
+    <p:spTree>
+      <p:nvGrpSpPr>
+        <p:cNvPr id="1" name=""/>
+        <p:cNvGrpSpPr/>
+        <p:nvPr/>
+      </p:nvGrpSpPr>
+      <p:grpSpPr>
+        <a:xfrm>
+          <a:off x="0" y="0"/>
+          <a:ext cx="0" cy="0"/>
+          <a:chOff x="0" y="0"/>
+          <a:chExt cx="0" cy="0"/>
+        </a:xfrm>
+      </p:grpSpPr>
+      <p:sp>
+        <p:nvSpPr>
+          <p:cNvPr id="2" name="Title 1">
+            <a:extLst>
+              <a:ext uri="{FF2B5EF4-FFF2-40B4-BE49-F238E27FC236}">
+                <a16:creationId xmlns:a16="http://schemas.microsoft.com/office/drawing/2014/main" id="{0B12FCE1-4A8F-4742-944B-1F7D87CCBFC1}"/>
+              </a:ext>
+            </a:extLst>
+          </p:cNvPr>
+          <p:cNvSpPr>
+            <a:spLocks noGrp="1"/>
+          </p:cNvSpPr>
+          <p:nvPr>
+            <p:ph type="title"/>
+          </p:nvPr>
+        </p:nvSpPr>
+        <p:spPr/>
+        <p:txBody>
+          <a:bodyPr/>
+          <a:lstStyle/>
+          <a:p>
+            <a:r>
+              <a:rPr lang="en-US" dirty="0" err="1"/>
+              <a:t>Calloc</a:t>
+            </a:r>
+            <a:r>
+              <a:rPr lang="en-US" dirty="0"/>
+              <a:t>(…)</a:t>
+            </a:r>
+          </a:p>
+        </p:txBody>
+      </p:sp>
+      <p:sp>
+        <p:nvSpPr>
+          <p:cNvPr id="3" name="Content Placeholder 2">
+            <a:extLst>
+              <a:ext uri="{FF2B5EF4-FFF2-40B4-BE49-F238E27FC236}">
+                <a16:creationId xmlns:a16="http://schemas.microsoft.com/office/drawing/2014/main" id="{EC4F8A2A-72C6-E24A-9994-AFCF7C469A89}"/>
+              </a:ext>
+            </a:extLst>
+          </p:cNvPr>
+          <p:cNvSpPr>
+            <a:spLocks noGrp="1"/>
+          </p:cNvSpPr>
+          <p:nvPr>
+            <p:ph idx="1"/>
+          </p:nvPr>
+        </p:nvSpPr>
+        <p:spPr>
+          <a:xfrm>
+            <a:off x="685801" y="2142067"/>
+            <a:ext cx="5105399" cy="3649133"/>
+          </a:xfrm>
+        </p:spPr>
+        <p:txBody>
+          <a:bodyPr/>
+          <a:lstStyle/>
+          <a:p>
+            <a:r>
+              <a:rPr lang="en-US" dirty="0" err="1"/>
+              <a:t>calloc</a:t>
+            </a:r>
+            <a:r>
+              <a:rPr lang="en-US" dirty="0"/>
+              <a:t> means Contiguous Allocation</a:t>
+            </a:r>
+          </a:p>
+          <a:p>
+            <a:r>
+              <a:rPr lang="en-US" dirty="0"/>
+              <a:t>Does the same as malloc, but instead of leaving the spaces uninitialized, it sets them to zero</a:t>
+            </a:r>
+          </a:p>
+          <a:p>
+            <a:r>
+              <a:rPr lang="en-US" dirty="0"/>
+              <a:t>Returns pointer to be casted</a:t>
+            </a:r>
+          </a:p>
+          <a:p>
+            <a:endParaRPr lang="en-US" dirty="0"/>
+          </a:p>
+        </p:txBody>
+      </p:sp>
+      <p:pic>
+        <p:nvPicPr>
+          <p:cNvPr id="6" name="Picture 5" descr="Text&#10;&#10;Description automatically generated">
+            <a:extLst>
+              <a:ext uri="{FF2B5EF4-FFF2-40B4-BE49-F238E27FC236}">
+                <a16:creationId xmlns:a16="http://schemas.microsoft.com/office/drawing/2014/main" id="{F6DDC20D-3CCF-1440-901C-87B99C29136C}"/>
+              </a:ext>
+            </a:extLst>
+          </p:cNvPr>
+          <p:cNvPicPr>
+            <a:picLocks noChangeAspect="1"/>
+          </p:cNvPicPr>
+          <p:nvPr/>
+        </p:nvPicPr>
+        <p:blipFill>
+          <a:blip r:embed="rId2"/>
+          <a:stretch>
+            <a:fillRect/>
+          </a:stretch>
+        </p:blipFill>
+        <p:spPr>
+          <a:xfrm>
+            <a:off x="6947916" y="-211127"/>
+            <a:ext cx="5360947" cy="2526423"/>
+          </a:xfrm>
+          <a:prstGeom prst="rect">
+            <a:avLst/>
+          </a:prstGeom>
+        </p:spPr>
+      </p:pic>
+      <p:pic>
+        <p:nvPicPr>
+          <p:cNvPr id="8" name="Picture 7" descr="Text&#10;&#10;Description automatically generated">
+            <a:extLst>
+              <a:ext uri="{FF2B5EF4-FFF2-40B4-BE49-F238E27FC236}">
+                <a16:creationId xmlns:a16="http://schemas.microsoft.com/office/drawing/2014/main" id="{D73DC7D9-E1B2-E44A-98BE-1DCE4CD007D9}"/>
+              </a:ext>
+            </a:extLst>
+          </p:cNvPr>
+          <p:cNvPicPr>
+            <a:picLocks noChangeAspect="1"/>
+          </p:cNvPicPr>
+          <p:nvPr/>
+        </p:nvPicPr>
+        <p:blipFill>
+          <a:blip r:embed="rId3"/>
+          <a:stretch>
+            <a:fillRect/>
+          </a:stretch>
+        </p:blipFill>
+        <p:spPr>
+          <a:xfrm>
+            <a:off x="6941357" y="1266942"/>
+            <a:ext cx="5367506" cy="2346138"/>
+          </a:xfrm>
+          <a:prstGeom prst="rect">
+            <a:avLst/>
+          </a:prstGeom>
+        </p:spPr>
+      </p:pic>
+      <p:pic>
+        <p:nvPicPr>
+          <p:cNvPr id="10" name="Picture 9" descr="Text&#10;&#10;Description automatically generated">
+            <a:extLst>
+              <a:ext uri="{FF2B5EF4-FFF2-40B4-BE49-F238E27FC236}">
+                <a16:creationId xmlns:a16="http://schemas.microsoft.com/office/drawing/2014/main" id="{C517D0D9-7659-8B41-AD7F-F1553058CED3}"/>
+              </a:ext>
+            </a:extLst>
+          </p:cNvPr>
+          <p:cNvPicPr>
+            <a:picLocks noChangeAspect="1"/>
+          </p:cNvPicPr>
+          <p:nvPr/>
+        </p:nvPicPr>
+        <p:blipFill>
+          <a:blip r:embed="rId4"/>
+          <a:stretch>
+            <a:fillRect/>
+          </a:stretch>
+        </p:blipFill>
+        <p:spPr>
+          <a:xfrm>
+            <a:off x="6567516" y="2628193"/>
+            <a:ext cx="4249710" cy="4701547"/>
+          </a:xfrm>
+          <a:prstGeom prst="rect">
+            <a:avLst/>
+          </a:prstGeom>
+        </p:spPr>
+      </p:pic>
+      <p:pic>
+        <p:nvPicPr>
+          <p:cNvPr id="14" name="Picture 13" descr="A picture containing table&#10;&#10;Description automatically generated">
+            <a:extLst>
+              <a:ext uri="{FF2B5EF4-FFF2-40B4-BE49-F238E27FC236}">
+                <a16:creationId xmlns:a16="http://schemas.microsoft.com/office/drawing/2014/main" id="{D1CA3AEC-BEF5-FA45-85DE-7F27B48CD567}"/>
+              </a:ext>
+            </a:extLst>
+          </p:cNvPr>
+          <p:cNvPicPr>
+            <a:picLocks noChangeAspect="1"/>
+          </p:cNvPicPr>
+          <p:nvPr/>
+        </p:nvPicPr>
+        <p:blipFill>
+          <a:blip r:embed="rId5"/>
+          <a:stretch>
+            <a:fillRect/>
+          </a:stretch>
+        </p:blipFill>
+        <p:spPr>
+          <a:xfrm>
+            <a:off x="9546336" y="2645018"/>
+            <a:ext cx="2902518" cy="4735039"/>
+          </a:xfrm>
+          <a:prstGeom prst="rect">
+            <a:avLst/>
+          </a:prstGeom>
+        </p:spPr>
+      </p:pic>
+    </p:spTree>
+    <p:extLst>
+      <p:ext uri="{BB962C8B-B14F-4D97-AF65-F5344CB8AC3E}">
+        <p14:creationId xmlns:p14="http://schemas.microsoft.com/office/powerpoint/2010/main" val="2265159579"/>
+      </p:ext>
+    </p:extLst>
+  </p:cSld>
+  <p:clrMapOvr>
+    <a:masterClrMapping/>
+  </p:clrMapOvr>
+</p:sld>
+</file>
+
+<file path=ppt/slides/slide24.xml><?xml version="1.0" encoding="utf-8"?>
+<p:sld xmlns:a="http://schemas.openxmlformats.org/drawingml/2006/main" xmlns:r="http://schemas.openxmlformats.org/officeDocument/2006/relationships" xmlns:p="http://schemas.openxmlformats.org/presentationml/2006/main">
+  <p:cSld>
+    <p:spTree>
+      <p:nvGrpSpPr>
+        <p:cNvPr id="1" name=""/>
+        <p:cNvGrpSpPr/>
+        <p:nvPr/>
+      </p:nvGrpSpPr>
+      <p:grpSpPr>
+        <a:xfrm>
+          <a:off x="0" y="0"/>
+          <a:ext cx="0" cy="0"/>
+          <a:chOff x="0" y="0"/>
+          <a:chExt cx="0" cy="0"/>
+        </a:xfrm>
+      </p:grpSpPr>
+      <p:sp>
+        <p:nvSpPr>
+          <p:cNvPr id="2" name="Title 1">
+            <a:extLst>
+              <a:ext uri="{FF2B5EF4-FFF2-40B4-BE49-F238E27FC236}">
+                <a16:creationId xmlns:a16="http://schemas.microsoft.com/office/drawing/2014/main" id="{DFE55673-756A-B741-A081-4883FA4901CC}"/>
+              </a:ext>
+            </a:extLst>
+          </p:cNvPr>
+          <p:cNvSpPr>
+            <a:spLocks noGrp="1"/>
+          </p:cNvSpPr>
+          <p:nvPr>
+            <p:ph type="title"/>
+          </p:nvPr>
+        </p:nvSpPr>
+        <p:spPr/>
+        <p:txBody>
+          <a:bodyPr/>
+          <a:lstStyle/>
+          <a:p>
+            <a:r>
+              <a:rPr lang="en-US" dirty="0" err="1"/>
+              <a:t>Realloc</a:t>
+            </a:r>
+            <a:r>
+              <a:rPr lang="en-US" dirty="0"/>
+              <a:t>(...)</a:t>
+            </a:r>
+          </a:p>
+        </p:txBody>
+      </p:sp>
+      <p:sp>
+        <p:nvSpPr>
+          <p:cNvPr id="3" name="Content Placeholder 2">
+            <a:extLst>
+              <a:ext uri="{FF2B5EF4-FFF2-40B4-BE49-F238E27FC236}">
+                <a16:creationId xmlns:a16="http://schemas.microsoft.com/office/drawing/2014/main" id="{F53BCB30-F980-6E48-8507-19CA7525AA04}"/>
+              </a:ext>
+            </a:extLst>
+          </p:cNvPr>
+          <p:cNvSpPr>
+            <a:spLocks noGrp="1"/>
+          </p:cNvSpPr>
+          <p:nvPr>
+            <p:ph idx="1"/>
+          </p:nvPr>
+        </p:nvSpPr>
+        <p:spPr>
+          <a:xfrm>
+            <a:off x="685801" y="2142067"/>
+            <a:ext cx="4922519" cy="3649133"/>
+          </a:xfrm>
+        </p:spPr>
+        <p:txBody>
+          <a:bodyPr/>
+          <a:lstStyle/>
+          <a:p>
+            <a:r>
+              <a:rPr lang="en-US" dirty="0" err="1"/>
+              <a:t>Realloc</a:t>
+            </a:r>
+            <a:r>
+              <a:rPr lang="en-US" dirty="0"/>
+              <a:t> means re-allocate memory</a:t>
+            </a:r>
+          </a:p>
+          <a:p>
+            <a:r>
+              <a:rPr lang="en-US" dirty="0"/>
+              <a:t>It’s meant change the size of a already allocated memory/pointer</a:t>
+            </a:r>
+          </a:p>
+          <a:p>
+            <a:r>
+              <a:rPr lang="en-US" dirty="0"/>
+              <a:t>Returns a pointer</a:t>
+            </a:r>
+          </a:p>
+          <a:p>
+            <a:endParaRPr lang="en-US" dirty="0"/>
+          </a:p>
+        </p:txBody>
+      </p:sp>
+      <p:pic>
+        <p:nvPicPr>
+          <p:cNvPr id="5" name="Picture 4" descr="Text&#10;&#10;Description automatically generated">
+            <a:extLst>
+              <a:ext uri="{FF2B5EF4-FFF2-40B4-BE49-F238E27FC236}">
+                <a16:creationId xmlns:a16="http://schemas.microsoft.com/office/drawing/2014/main" id="{7072A0EE-D711-FC49-93BF-4AD0F5572322}"/>
+              </a:ext>
+            </a:extLst>
+          </p:cNvPr>
+          <p:cNvPicPr>
+            <a:picLocks noChangeAspect="1"/>
+          </p:cNvPicPr>
+          <p:nvPr/>
+        </p:nvPicPr>
+        <p:blipFill>
+          <a:blip r:embed="rId2"/>
+          <a:stretch>
+            <a:fillRect/>
+          </a:stretch>
+        </p:blipFill>
+        <p:spPr>
+          <a:xfrm>
+            <a:off x="6866282" y="1251967"/>
+            <a:ext cx="4922519" cy="2151634"/>
+          </a:xfrm>
+          <a:prstGeom prst="rect">
+            <a:avLst/>
+          </a:prstGeom>
+        </p:spPr>
+      </p:pic>
+      <p:pic>
+        <p:nvPicPr>
+          <p:cNvPr id="7" name="Picture 6" descr="A picture containing text&#10;&#10;Description automatically generated">
+            <a:extLst>
+              <a:ext uri="{FF2B5EF4-FFF2-40B4-BE49-F238E27FC236}">
+                <a16:creationId xmlns:a16="http://schemas.microsoft.com/office/drawing/2014/main" id="{855D06C6-4264-454B-B888-C887252D1F86}"/>
+              </a:ext>
+            </a:extLst>
+          </p:cNvPr>
+          <p:cNvPicPr>
+            <a:picLocks noChangeAspect="1"/>
+          </p:cNvPicPr>
+          <p:nvPr/>
+        </p:nvPicPr>
+        <p:blipFill>
+          <a:blip r:embed="rId3"/>
+          <a:stretch>
+            <a:fillRect/>
+          </a:stretch>
+        </p:blipFill>
+        <p:spPr>
+          <a:xfrm>
+            <a:off x="6918254" y="-552374"/>
+            <a:ext cx="4818576" cy="2913888"/>
+          </a:xfrm>
+          <a:prstGeom prst="rect">
+            <a:avLst/>
+          </a:prstGeom>
+        </p:spPr>
+      </p:pic>
+      <p:pic>
+        <p:nvPicPr>
+          <p:cNvPr id="9" name="Picture 8" descr="Text&#10;&#10;Description automatically generated">
+            <a:extLst>
+              <a:ext uri="{FF2B5EF4-FFF2-40B4-BE49-F238E27FC236}">
+                <a16:creationId xmlns:a16="http://schemas.microsoft.com/office/drawing/2014/main" id="{41E8414D-617F-5A47-9078-045178281BCD}"/>
+              </a:ext>
+            </a:extLst>
+          </p:cNvPr>
+          <p:cNvPicPr>
+            <a:picLocks noChangeAspect="1"/>
+          </p:cNvPicPr>
+          <p:nvPr/>
+        </p:nvPicPr>
+        <p:blipFill>
+          <a:blip r:embed="rId4"/>
+          <a:stretch>
+            <a:fillRect/>
+          </a:stretch>
+        </p:blipFill>
+        <p:spPr>
+          <a:xfrm>
+            <a:off x="8977503" y="2597168"/>
+            <a:ext cx="3412087" cy="4755351"/>
+          </a:xfrm>
+          <a:prstGeom prst="rect">
+            <a:avLst/>
+          </a:prstGeom>
+        </p:spPr>
+      </p:pic>
+      <p:pic>
+        <p:nvPicPr>
+          <p:cNvPr id="15" name="Picture 14" descr="Text&#10;&#10;Description automatically generated">
+            <a:extLst>
+              <a:ext uri="{FF2B5EF4-FFF2-40B4-BE49-F238E27FC236}">
+                <a16:creationId xmlns:a16="http://schemas.microsoft.com/office/drawing/2014/main" id="{173D55EF-5213-B54D-983A-9DED79C0F861}"/>
+              </a:ext>
+            </a:extLst>
+          </p:cNvPr>
+          <p:cNvPicPr>
+            <a:picLocks noChangeAspect="1"/>
+          </p:cNvPicPr>
+          <p:nvPr/>
+        </p:nvPicPr>
+        <p:blipFill>
+          <a:blip r:embed="rId5"/>
+          <a:stretch>
+            <a:fillRect/>
+          </a:stretch>
+        </p:blipFill>
+        <p:spPr>
+          <a:xfrm>
+            <a:off x="6211316" y="2597168"/>
+            <a:ext cx="3307274" cy="3756048"/>
+          </a:xfrm>
+          <a:prstGeom prst="rect">
+            <a:avLst/>
+          </a:prstGeom>
+        </p:spPr>
+      </p:pic>
+    </p:spTree>
+    <p:extLst>
+      <p:ext uri="{BB962C8B-B14F-4D97-AF65-F5344CB8AC3E}">
+        <p14:creationId xmlns:p14="http://schemas.microsoft.com/office/powerpoint/2010/main" val="1014127281"/>
+      </p:ext>
+    </p:extLst>
+  </p:cSld>
+  <p:clrMapOvr>
+    <a:masterClrMapping/>
+  </p:clrMapOvr>
+</p:sld>
+</file>
+
+<file path=ppt/slides/slide25.xml><?xml version="1.0" encoding="utf-8"?>
+<p:sld xmlns:a="http://schemas.openxmlformats.org/drawingml/2006/main" xmlns:r="http://schemas.openxmlformats.org/officeDocument/2006/relationships" xmlns:p="http://schemas.openxmlformats.org/presentationml/2006/main">
+  <p:cSld>
+    <p:bg>
+      <p:bgPr>
+        <a:blipFill>
+          <a:blip r:embed="rId2"/>
+          <a:stretch/>
+        </a:blipFill>
+        <a:effectLst/>
+      </p:bgPr>
+    </p:bg>
+    <p:spTree>
+      <p:nvGrpSpPr>
+        <p:cNvPr id="1" name=""/>
+        <p:cNvGrpSpPr/>
+        <p:nvPr/>
+      </p:nvGrpSpPr>
+      <p:grpSpPr>
+        <a:xfrm>
+          <a:off x="0" y="0"/>
+          <a:ext cx="0" cy="0"/>
+          <a:chOff x="0" y="0"/>
+          <a:chExt cx="0" cy="0"/>
+        </a:xfrm>
+      </p:grpSpPr>
+      <p:sp>
+        <p:nvSpPr>
+          <p:cNvPr id="2" name="Title 1">
+            <a:extLst>
+              <a:ext uri="{FF2B5EF4-FFF2-40B4-BE49-F238E27FC236}">
+                <a16:creationId xmlns:a16="http://schemas.microsoft.com/office/drawing/2014/main" id="{33BA33AE-F7FB-D545-BBD1-0588E8F79666}"/>
+              </a:ext>
+            </a:extLst>
+          </p:cNvPr>
+          <p:cNvSpPr>
+            <a:spLocks noGrp="1"/>
+          </p:cNvSpPr>
+          <p:nvPr>
+            <p:ph type="title"/>
+          </p:nvPr>
+        </p:nvSpPr>
+        <p:spPr>
+          <a:xfrm>
+            <a:off x="685801" y="609600"/>
+            <a:ext cx="5219699" cy="1456267"/>
+          </a:xfrm>
+        </p:spPr>
+        <p:txBody>
+          <a:bodyPr>
+            <a:normAutofit/>
+          </a:bodyPr>
+          <a:lstStyle/>
+          <a:p>
+            <a:r>
+              <a:rPr lang="en-US" dirty="0"/>
+              <a:t>Free(…)</a:t>
+            </a:r>
+          </a:p>
+        </p:txBody>
+      </p:sp>
+      <p:sp>
+        <p:nvSpPr>
+          <p:cNvPr id="3" name="Content Placeholder 2">
+            <a:extLst>
+              <a:ext uri="{FF2B5EF4-FFF2-40B4-BE49-F238E27FC236}">
+                <a16:creationId xmlns:a16="http://schemas.microsoft.com/office/drawing/2014/main" id="{BA105A31-EB33-BA45-856E-95632064E8A2}"/>
+              </a:ext>
+            </a:extLst>
+          </p:cNvPr>
+          <p:cNvSpPr>
+            <a:spLocks noGrp="1"/>
+          </p:cNvSpPr>
+          <p:nvPr>
+            <p:ph idx="1"/>
+          </p:nvPr>
+        </p:nvSpPr>
+        <p:spPr>
+          <a:xfrm>
+            <a:off x="685801" y="2142067"/>
+            <a:ext cx="5219699" cy="3649133"/>
+          </a:xfrm>
+        </p:spPr>
+        <p:txBody>
+          <a:bodyPr>
+            <a:normAutofit/>
+          </a:bodyPr>
+          <a:lstStyle/>
+          <a:p>
+            <a:r>
+              <a:rPr lang="en-US" dirty="0"/>
+              <a:t>Memory allocated with the functions mentioned does not get freed automatically</a:t>
+            </a:r>
+          </a:p>
+          <a:p>
+            <a:r>
+              <a:rPr lang="en-US" dirty="0"/>
+              <a:t>It must be freed by the free(…) function</a:t>
+            </a:r>
+          </a:p>
+          <a:p>
+            <a:r>
+              <a:rPr lang="en-US" dirty="0"/>
+              <a:t>It’s simple, just give it the pointer to the memory</a:t>
+            </a:r>
+          </a:p>
+        </p:txBody>
+      </p:sp>
+      <p:pic>
+        <p:nvPicPr>
+          <p:cNvPr id="5" name="Picture 4" descr="A picture containing application&#10;&#10;Description automatically generated">
+            <a:extLst>
+              <a:ext uri="{FF2B5EF4-FFF2-40B4-BE49-F238E27FC236}">
+                <a16:creationId xmlns:a16="http://schemas.microsoft.com/office/drawing/2014/main" id="{9DF324C4-DF43-AF4C-BC18-97857290E48B}"/>
+              </a:ext>
+            </a:extLst>
+          </p:cNvPr>
+          <p:cNvPicPr>
+            <a:picLocks noChangeAspect="1"/>
+          </p:cNvPicPr>
+          <p:nvPr/>
+        </p:nvPicPr>
+        <p:blipFill rotWithShape="1">
+          <a:blip r:embed="rId3"/>
+          <a:srcRect l="2232" r="7770" b="1"/>
+          <a:stretch/>
+        </p:blipFill>
+        <p:spPr>
+          <a:xfrm>
+            <a:off x="6198830" y="639097"/>
+            <a:ext cx="5447070" cy="5250425"/>
+          </a:xfrm>
+          <a:prstGeom prst="roundRect">
+            <a:avLst>
+              <a:gd name="adj" fmla="val 4380"/>
+            </a:avLst>
+          </a:prstGeom>
+          <a:ln w="50800" cap="sq" cmpd="dbl">
+            <a:gradFill flip="none" rotWithShape="1">
+              <a:gsLst>
+                <a:gs pos="0">
+                  <a:srgbClr val="FFFFFF"/>
+                </a:gs>
+                <a:gs pos="100000">
+                  <a:schemeClr val="tx1">
+                    <a:alpha val="0"/>
+                  </a:schemeClr>
+                </a:gs>
+              </a:gsLst>
+              <a:path path="circle">
+                <a:fillToRect l="50000" t="50000" r="50000" b="50000"/>
+              </a:path>
+              <a:tileRect/>
+            </a:gradFill>
+            <a:miter lim="800000"/>
+          </a:ln>
+          <a:effectLst>
+            <a:outerShdw blurRad="254000" algn="tl" rotWithShape="0">
+              <a:srgbClr val="000000">
+                <a:alpha val="43000"/>
+              </a:srgbClr>
+            </a:outerShdw>
+          </a:effectLst>
+        </p:spPr>
+      </p:pic>
+    </p:spTree>
+    <p:extLst>
+      <p:ext uri="{BB962C8B-B14F-4D97-AF65-F5344CB8AC3E}">
+        <p14:creationId xmlns:p14="http://schemas.microsoft.com/office/powerpoint/2010/main" val="2675113876"/>
+      </p:ext>
+    </p:extLst>
+  </p:cSld>
+  <p:clrMapOvr>
+    <a:masterClrMapping/>
+  </p:clrMapOvr>
+</p:sld>
+</file>
+
+<file path=ppt/slides/slide26.xml><?xml version="1.0" encoding="utf-8"?>
+<p:sld xmlns:a="http://schemas.openxmlformats.org/drawingml/2006/main" xmlns:r="http://schemas.openxmlformats.org/officeDocument/2006/relationships" xmlns:p="http://schemas.openxmlformats.org/presentationml/2006/main">
+  <p:cSld>
+    <p:spTree>
+      <p:nvGrpSpPr>
+        <p:cNvPr id="1" name=""/>
+        <p:cNvGrpSpPr/>
+        <p:nvPr/>
+      </p:nvGrpSpPr>
+      <p:grpSpPr>
+        <a:xfrm>
+          <a:off x="0" y="0"/>
+          <a:ext cx="0" cy="0"/>
+          <a:chOff x="0" y="0"/>
+          <a:chExt cx="0" cy="0"/>
+        </a:xfrm>
+      </p:grpSpPr>
+      <p:sp>
+        <p:nvSpPr>
+          <p:cNvPr id="2" name="Title 1">
+            <a:extLst>
+              <a:ext uri="{FF2B5EF4-FFF2-40B4-BE49-F238E27FC236}">
+                <a16:creationId xmlns:a16="http://schemas.microsoft.com/office/drawing/2014/main" id="{C7DA4FEA-5906-D145-BC36-2C5CF219C722}"/>
+              </a:ext>
+            </a:extLst>
+          </p:cNvPr>
+          <p:cNvSpPr>
+            <a:spLocks noGrp="1"/>
+          </p:cNvSpPr>
+          <p:nvPr>
+            <p:ph type="title"/>
+          </p:nvPr>
+        </p:nvSpPr>
+        <p:spPr>
+          <a:xfrm>
+            <a:off x="539497" y="219456"/>
+            <a:ext cx="10131425" cy="1456267"/>
+          </a:xfrm>
+        </p:spPr>
+        <p:txBody>
+          <a:bodyPr/>
+          <a:lstStyle/>
+          <a:p>
+            <a:r>
+              <a:rPr lang="en-US" dirty="0"/>
+              <a:t>Overview</a:t>
+            </a:r>
+          </a:p>
+        </p:txBody>
+      </p:sp>
+      <p:sp>
+        <p:nvSpPr>
+          <p:cNvPr id="3" name="Content Placeholder 2">
+            <a:extLst>
+              <a:ext uri="{FF2B5EF4-FFF2-40B4-BE49-F238E27FC236}">
+                <a16:creationId xmlns:a16="http://schemas.microsoft.com/office/drawing/2014/main" id="{93DBAB44-569A-6C4D-BD21-693EC535872D}"/>
+              </a:ext>
+            </a:extLst>
+          </p:cNvPr>
+          <p:cNvSpPr>
+            <a:spLocks noGrp="1"/>
+          </p:cNvSpPr>
+          <p:nvPr>
+            <p:ph idx="1"/>
+          </p:nvPr>
+        </p:nvSpPr>
+        <p:spPr>
+          <a:xfrm>
+            <a:off x="429769" y="2633472"/>
+            <a:ext cx="10131425" cy="2926080"/>
+          </a:xfrm>
+        </p:spPr>
+        <p:txBody>
+          <a:bodyPr>
+            <a:normAutofit fontScale="92500" lnSpcReduction="10000"/>
+          </a:bodyPr>
+          <a:lstStyle/>
+          <a:p>
+            <a:r>
+              <a:rPr lang="en-US" sz="2800" dirty="0"/>
+              <a:t>Pointers</a:t>
+            </a:r>
+          </a:p>
+          <a:p>
+            <a:pPr lvl="1"/>
+            <a:r>
+              <a:rPr lang="en-US" sz="2400" dirty="0"/>
+              <a:t>Memory Addresses</a:t>
+            </a:r>
+          </a:p>
+          <a:p>
+            <a:pPr lvl="1"/>
+            <a:r>
+              <a:rPr lang="en-US" sz="2400" dirty="0"/>
+              <a:t>Address Of Operator</a:t>
+            </a:r>
+          </a:p>
+          <a:p>
+            <a:pPr lvl="1"/>
+            <a:r>
+              <a:rPr lang="en-US" sz="2400" dirty="0"/>
+              <a:t>Pointers Overview</a:t>
+            </a:r>
+          </a:p>
+          <a:p>
+            <a:pPr lvl="1"/>
+            <a:r>
+              <a:rPr lang="en-US" sz="2400" dirty="0"/>
+              <a:t>Initializing/Accessing/Modifying Pointers</a:t>
+            </a:r>
+          </a:p>
+          <a:p>
+            <a:pPr lvl="1"/>
+            <a:r>
+              <a:rPr lang="en-US" sz="2400" dirty="0"/>
+              <a:t>Dereferencing</a:t>
+            </a:r>
+          </a:p>
+          <a:p>
+            <a:r>
+              <a:rPr lang="en-US" sz="2800" dirty="0"/>
+              <a:t>Pointers and Arrays</a:t>
+            </a:r>
+          </a:p>
+          <a:p>
+            <a:pPr lvl="1"/>
+            <a:r>
+              <a:rPr lang="en-US" sz="2600" dirty="0"/>
+              <a:t>Accessing</a:t>
+            </a:r>
+          </a:p>
+          <a:p>
+            <a:pPr lvl="1"/>
+            <a:r>
+              <a:rPr lang="en-US" sz="2600" dirty="0"/>
+              <a:t>Modifying</a:t>
+            </a:r>
+          </a:p>
+          <a:p>
+            <a:r>
+              <a:rPr lang="en-US" sz="2800" dirty="0"/>
+              <a:t>Pointers and Functions</a:t>
+            </a:r>
+          </a:p>
+          <a:p>
+            <a:r>
+              <a:rPr lang="en-US" sz="2800" dirty="0"/>
+              <a:t>Memory Allocation</a:t>
+            </a:r>
+          </a:p>
+        </p:txBody>
+      </p:sp>
+    </p:spTree>
+    <p:extLst>
+      <p:ext uri="{BB962C8B-B14F-4D97-AF65-F5344CB8AC3E}">
+        <p14:creationId xmlns:p14="http://schemas.microsoft.com/office/powerpoint/2010/main" val="716470770"/>
+      </p:ext>
+    </p:extLst>
+  </p:cSld>
+  <p:clrMapOvr>
+    <a:masterClrMapping/>
+  </p:clrMapOvr>
+</p:sld>
+</file>
+
+<file path=ppt/slides/slide27.xml><?xml version="1.0" encoding="utf-8"?>
+<p:sld xmlns:a="http://schemas.openxmlformats.org/drawingml/2006/main" xmlns:r="http://schemas.openxmlformats.org/officeDocument/2006/relationships" xmlns:p="http://schemas.openxmlformats.org/presentationml/2006/main">
+  <p:cSld>
+    <p:spTree>
+      <p:nvGrpSpPr>
+        <p:cNvPr id="1" name=""/>
+        <p:cNvGrpSpPr/>
+        <p:nvPr/>
+      </p:nvGrpSpPr>
+      <p:grpSpPr>
+        <a:xfrm>
+          <a:off x="0" y="0"/>
+          <a:ext cx="0" cy="0"/>
+          <a:chOff x="0" y="0"/>
+          <a:chExt cx="0" cy="0"/>
+        </a:xfrm>
+      </p:grpSpPr>
+      <p:sp>
+        <p:nvSpPr>
+          <p:cNvPr id="2" name="Title 1">
+            <a:extLst>
+              <a:ext uri="{FF2B5EF4-FFF2-40B4-BE49-F238E27FC236}">
+                <a16:creationId xmlns:a16="http://schemas.microsoft.com/office/drawing/2014/main" id="{85A78A2E-1182-6147-AD4D-68EB9ADCB987}"/>
+              </a:ext>
+            </a:extLst>
+          </p:cNvPr>
+          <p:cNvSpPr>
+            <a:spLocks noGrp="1"/>
+          </p:cNvSpPr>
+          <p:nvPr>
+            <p:ph type="title"/>
+          </p:nvPr>
+        </p:nvSpPr>
+        <p:spPr/>
+        <p:txBody>
+          <a:bodyPr/>
+          <a:lstStyle/>
+          <a:p>
+            <a:r>
+              <a:rPr lang="en-US" dirty="0"/>
+              <a:t>References</a:t>
+            </a:r>
+          </a:p>
+        </p:txBody>
+      </p:sp>
+      <p:sp>
+        <p:nvSpPr>
+          <p:cNvPr id="3" name="Content Placeholder 2">
+            <a:extLst>
+              <a:ext uri="{FF2B5EF4-FFF2-40B4-BE49-F238E27FC236}">
+                <a16:creationId xmlns:a16="http://schemas.microsoft.com/office/drawing/2014/main" id="{0523291A-621D-874D-8E8A-10E7A5750E3B}"/>
+              </a:ext>
+            </a:extLst>
+          </p:cNvPr>
+          <p:cNvSpPr>
+            <a:spLocks noGrp="1"/>
+          </p:cNvSpPr>
+          <p:nvPr>
+            <p:ph idx="1"/>
+          </p:nvPr>
+        </p:nvSpPr>
+        <p:spPr>
+          <a:xfrm>
+            <a:off x="527305" y="4706112"/>
+            <a:ext cx="10131425" cy="2852928"/>
+          </a:xfrm>
+        </p:spPr>
+        <p:txBody>
+          <a:bodyPr/>
+          <a:lstStyle/>
+          <a:p>
+            <a:r>
+              <a:rPr lang="en-US" dirty="0">
+                <a:hlinkClick r:id="rId3"/>
+              </a:rPr>
+              <a:t>https://www.programiz.com/c-programming/c-pointers</a:t>
+            </a:r>
+            <a:endParaRPr lang="en-US" dirty="0"/>
+          </a:p>
+          <a:p>
+            <a:r>
+              <a:rPr lang="en-US" dirty="0">
+                <a:hlinkClick r:id="rId4"/>
+              </a:rPr>
+              <a:t>https://www.programiz.com/c-programming/c-pointers-arrays</a:t>
+            </a:r>
+            <a:endParaRPr lang="en-US" dirty="0"/>
+          </a:p>
+          <a:p>
+            <a:r>
+              <a:rPr lang="en-US" dirty="0">
+                <a:hlinkClick r:id="rId5"/>
+              </a:rPr>
+              <a:t>https://www.freecodecamp.org/news/the-c-beginners-handbook/#pointers</a:t>
+            </a:r>
+            <a:endParaRPr lang="en-US" dirty="0"/>
+          </a:p>
+          <a:p>
+            <a:r>
+              <a:rPr lang="en-US" dirty="0">
+                <a:hlinkClick r:id="rId6"/>
+              </a:rPr>
+              <a:t>https://denniskubes.com/2012/08/17/basics-of-memory-addresses-in-c/</a:t>
+            </a:r>
+            <a:endParaRPr lang="en-US" dirty="0"/>
+          </a:p>
+          <a:p>
+            <a:r>
+              <a:rPr lang="en-US" dirty="0">
+                <a:hlinkClick r:id="rId7"/>
+              </a:rPr>
+              <a:t>https://computer.howstuffworks.com/c23.htm</a:t>
+            </a:r>
+            <a:endParaRPr lang="en-US" dirty="0"/>
+          </a:p>
+          <a:p>
+            <a:r>
+              <a:rPr lang="en-US" dirty="0">
+                <a:hlinkClick r:id="rId8"/>
+              </a:rPr>
+              <a:t>http://www.cs.ecu.edu/karl/3300/spr14/Notes/C/Memory/memory.html#:~:text=A%20memory%20address%20is%20called,type%20of%20the%20executable%20program</a:t>
+            </a:r>
+            <a:r>
+              <a:rPr lang="en-US" dirty="0"/>
+              <a:t>).</a:t>
+            </a:r>
+          </a:p>
+          <a:p>
+            <a:r>
+              <a:rPr lang="en-US" dirty="0">
+                <a:hlinkClick r:id="rId9"/>
+              </a:rPr>
+              <a:t>https://www.udemy.com/course/c-programming-for-beginners-/learn/lecture/8795422#overview</a:t>
+            </a:r>
+            <a:endParaRPr lang="en-US" dirty="0"/>
+          </a:p>
+          <a:p>
+            <a:r>
+              <a:rPr lang="en-US" dirty="0">
+                <a:hlinkClick r:id="rId10"/>
+              </a:rPr>
+              <a:t>https://www.programiz.com/c-programming/c-pointer-functions</a:t>
+            </a:r>
+            <a:endParaRPr lang="en-US" dirty="0"/>
+          </a:p>
+          <a:p>
+            <a:r>
+              <a:rPr lang="en-US" dirty="0">
+                <a:hlinkClick r:id="rId11"/>
+              </a:rPr>
+              <a:t>https://www.programiz.com/c-programming/c-dynamic-memory-allocation</a:t>
+            </a:r>
+            <a:endParaRPr lang="en-US" dirty="0"/>
+          </a:p>
+          <a:p>
+            <a:endParaRPr lang="en-US" dirty="0"/>
+          </a:p>
+          <a:p>
+            <a:endParaRPr lang="en-US" dirty="0"/>
+          </a:p>
+          <a:p>
+            <a:endParaRPr lang="en-US" dirty="0"/>
+          </a:p>
+          <a:p>
+            <a:endParaRPr lang="en-US" dirty="0"/>
+          </a:p>
+          <a:p>
+            <a:endParaRPr lang="en-US" dirty="0"/>
+          </a:p>
+          <a:p>
+            <a:endParaRPr lang="en-US" dirty="0"/>
+          </a:p>
+          <a:p>
+            <a:endParaRPr lang="en-US" dirty="0"/>
+          </a:p>
+          <a:p>
+            <a:endParaRPr lang="en-US" dirty="0"/>
+          </a:p>
+          <a:p>
+            <a:endParaRPr lang="en-US" dirty="0"/>
+          </a:p>
+          <a:p>
+            <a:endParaRPr lang="en-US" dirty="0"/>
+          </a:p>
+          <a:p>
+            <a:endParaRPr lang="en-US" dirty="0"/>
+          </a:p>
+        </p:txBody>
+      </p:sp>
+    </p:spTree>
+    <p:extLst>
+      <p:ext uri="{BB962C8B-B14F-4D97-AF65-F5344CB8AC3E}">
+        <p14:creationId xmlns:p14="http://schemas.microsoft.com/office/powerpoint/2010/main" val="867669438"/>
       </p:ext>
     </p:extLst>
   </p:cSld>

</xml_diff>